<commit_message>
QA: Nunit Assertions (update to Week 5 presentation) + example test with Nunit assertions
</commit_message>
<xml_diff>
--- a/Presentations/QA Automation Course Week 5.pptx
+++ b/Presentations/QA Automation Course Week 5.pptx
@@ -16,7 +16,15 @@
     <p:sldId id="287" r:id="rId10"/>
     <p:sldId id="288" r:id="rId11"/>
     <p:sldId id="298" r:id="rId12"/>
-    <p:sldId id="292" r:id="rId13"/>
+    <p:sldId id="289" r:id="rId13"/>
+    <p:sldId id="290" r:id="rId14"/>
+    <p:sldId id="291" r:id="rId15"/>
+    <p:sldId id="294" r:id="rId16"/>
+    <p:sldId id="299" r:id="rId17"/>
+    <p:sldId id="293" r:id="rId18"/>
+    <p:sldId id="270" r:id="rId19"/>
+    <p:sldId id="260" r:id="rId20"/>
+    <p:sldId id="292" r:id="rId21"/>
   </p:sldIdLst>
   <p:sldSz cx="12192000" cy="6858000"/>
   <p:notesSz cx="6858000" cy="9144000"/>
@@ -254,7 +262,7 @@
           <a:p>
             <a:fld id="{CD8154C3-BB2F-4D85-B412-A0EFA0706C73}" type="datetimeFigureOut">
               <a:rPr lang="bg-BG" smtClean="0"/>
-              <a:t>22.5.2017 г.</a:t>
+              <a:t>29.5.2017 г.</a:t>
             </a:fld>
             <a:endParaRPr lang="bg-BG"/>
           </a:p>
@@ -424,7 +432,7 @@
           <a:p>
             <a:fld id="{CD8154C3-BB2F-4D85-B412-A0EFA0706C73}" type="datetimeFigureOut">
               <a:rPr lang="bg-BG" smtClean="0"/>
-              <a:t>22.5.2017 г.</a:t>
+              <a:t>29.5.2017 г.</a:t>
             </a:fld>
             <a:endParaRPr lang="bg-BG"/>
           </a:p>
@@ -604,7 +612,7 @@
           <a:p>
             <a:fld id="{CD8154C3-BB2F-4D85-B412-A0EFA0706C73}" type="datetimeFigureOut">
               <a:rPr lang="bg-BG" smtClean="0"/>
-              <a:t>22.5.2017 г.</a:t>
+              <a:t>29.5.2017 г.</a:t>
             </a:fld>
             <a:endParaRPr lang="bg-BG"/>
           </a:p>
@@ -774,7 +782,7 @@
           <a:p>
             <a:fld id="{CD8154C3-BB2F-4D85-B412-A0EFA0706C73}" type="datetimeFigureOut">
               <a:rPr lang="bg-BG" smtClean="0"/>
-              <a:t>22.5.2017 г.</a:t>
+              <a:t>29.5.2017 г.</a:t>
             </a:fld>
             <a:endParaRPr lang="bg-BG"/>
           </a:p>
@@ -1020,7 +1028,7 @@
           <a:p>
             <a:fld id="{CD8154C3-BB2F-4D85-B412-A0EFA0706C73}" type="datetimeFigureOut">
               <a:rPr lang="bg-BG" smtClean="0"/>
-              <a:t>22.5.2017 г.</a:t>
+              <a:t>29.5.2017 г.</a:t>
             </a:fld>
             <a:endParaRPr lang="bg-BG"/>
           </a:p>
@@ -1252,7 +1260,7 @@
           <a:p>
             <a:fld id="{CD8154C3-BB2F-4D85-B412-A0EFA0706C73}" type="datetimeFigureOut">
               <a:rPr lang="bg-BG" smtClean="0"/>
-              <a:t>22.5.2017 г.</a:t>
+              <a:t>29.5.2017 г.</a:t>
             </a:fld>
             <a:endParaRPr lang="bg-BG"/>
           </a:p>
@@ -1619,7 +1627,7 @@
           <a:p>
             <a:fld id="{CD8154C3-BB2F-4D85-B412-A0EFA0706C73}" type="datetimeFigureOut">
               <a:rPr lang="bg-BG" smtClean="0"/>
-              <a:t>22.5.2017 г.</a:t>
+              <a:t>29.5.2017 г.</a:t>
             </a:fld>
             <a:endParaRPr lang="bg-BG"/>
           </a:p>
@@ -1737,7 +1745,7 @@
           <a:p>
             <a:fld id="{CD8154C3-BB2F-4D85-B412-A0EFA0706C73}" type="datetimeFigureOut">
               <a:rPr lang="bg-BG" smtClean="0"/>
-              <a:t>22.5.2017 г.</a:t>
+              <a:t>29.5.2017 г.</a:t>
             </a:fld>
             <a:endParaRPr lang="bg-BG"/>
           </a:p>
@@ -1832,7 +1840,7 @@
           <a:p>
             <a:fld id="{CD8154C3-BB2F-4D85-B412-A0EFA0706C73}" type="datetimeFigureOut">
               <a:rPr lang="bg-BG" smtClean="0"/>
-              <a:t>22.5.2017 г.</a:t>
+              <a:t>29.5.2017 г.</a:t>
             </a:fld>
             <a:endParaRPr lang="bg-BG"/>
           </a:p>
@@ -2109,7 +2117,7 @@
           <a:p>
             <a:fld id="{CD8154C3-BB2F-4D85-B412-A0EFA0706C73}" type="datetimeFigureOut">
               <a:rPr lang="bg-BG" smtClean="0"/>
-              <a:t>22.5.2017 г.</a:t>
+              <a:t>29.5.2017 г.</a:t>
             </a:fld>
             <a:endParaRPr lang="bg-BG"/>
           </a:p>
@@ -2362,7 +2370,7 @@
           <a:p>
             <a:fld id="{CD8154C3-BB2F-4D85-B412-A0EFA0706C73}" type="datetimeFigureOut">
               <a:rPr lang="bg-BG" smtClean="0"/>
-              <a:t>22.5.2017 г.</a:t>
+              <a:t>29.5.2017 г.</a:t>
             </a:fld>
             <a:endParaRPr lang="bg-BG"/>
           </a:p>
@@ -2575,7 +2583,7 @@
           <a:p>
             <a:fld id="{CD8154C3-BB2F-4D85-B412-A0EFA0706C73}" type="datetimeFigureOut">
               <a:rPr lang="bg-BG" smtClean="0"/>
-              <a:t>22.5.2017 г.</a:t>
+              <a:t>29.5.2017 г.</a:t>
             </a:fld>
             <a:endParaRPr lang="bg-BG"/>
           </a:p>
@@ -3815,61 +3823,1895 @@
             <p:ph type="title"/>
           </p:nvPr>
         </p:nvSpPr>
+        <p:spPr/>
+        <p:txBody>
+          <a:bodyPr/>
+          <a:lstStyle/>
+          <a:p>
+            <a:pPr algn="ctr"/>
+            <a:r>
+              <a:rPr lang="en-US" dirty="0" err="1"/>
+              <a:t>Nunit</a:t>
+            </a:r>
+            <a:r>
+              <a:rPr lang="en-US" dirty="0"/>
+              <a:t> </a:t>
+            </a:r>
+            <a:r>
+              <a:rPr lang="en-US" dirty="0" smtClean="0"/>
+              <a:t>Assertions (1)</a:t>
+            </a:r>
+            <a:endParaRPr lang="en-US" dirty="0"/>
+          </a:p>
+        </p:txBody>
+      </p:sp>
+      <p:sp>
+        <p:nvSpPr>
+          <p:cNvPr id="3" name="Content Placeholder 2"/>
+          <p:cNvSpPr>
+            <a:spLocks noGrp="1"/>
+          </p:cNvSpPr>
+          <p:nvPr>
+            <p:ph idx="1"/>
+          </p:nvPr>
+        </p:nvSpPr>
         <p:spPr>
           <a:xfrm>
-            <a:off x="995449" y="637366"/>
-            <a:ext cx="10515600" cy="1325563"/>
+            <a:off x="838200" y="1903615"/>
+            <a:ext cx="10708178" cy="4305992"/>
           </a:xfrm>
         </p:spPr>
         <p:txBody>
+          <a:bodyPr>
+            <a:normAutofit/>
+          </a:bodyPr>
+          <a:lstStyle/>
+          <a:p>
+            <a:pPr lvl="1"/>
+            <a:r>
+              <a:rPr lang="en-US" dirty="0" smtClean="0"/>
+              <a:t>Assertions are used to CHECK that what is going </a:t>
+            </a:r>
+            <a:r>
+              <a:rPr lang="en-US" dirty="0"/>
+              <a:t>o</a:t>
+            </a:r>
+            <a:r>
+              <a:rPr lang="en-US" dirty="0" smtClean="0"/>
+              <a:t>n meets what is expected (in a pretty way </a:t>
+            </a:r>
+            <a:r>
+              <a:rPr lang="en-US" dirty="0" smtClean="0">
+                <a:sym typeface="Wingdings" panose="05000000000000000000" pitchFamily="2" charset="2"/>
+              </a:rPr>
+              <a:t>) If assertion fails, </a:t>
+            </a:r>
+            <a:r>
+              <a:rPr lang="en-US" b="1" dirty="0" smtClean="0">
+                <a:sym typeface="Wingdings" panose="05000000000000000000" pitchFamily="2" charset="2"/>
+              </a:rPr>
+              <a:t>Failure is reported for the current test</a:t>
+            </a:r>
+            <a:r>
+              <a:rPr lang="en-US" dirty="0" smtClean="0">
+                <a:sym typeface="Wingdings" panose="05000000000000000000" pitchFamily="2" charset="2"/>
+              </a:rPr>
+              <a:t>, and </a:t>
+            </a:r>
+            <a:r>
+              <a:rPr lang="en-US" b="1" dirty="0" smtClean="0">
+                <a:sym typeface="Wingdings" panose="05000000000000000000" pitchFamily="2" charset="2"/>
+              </a:rPr>
+              <a:t>further execution of the current test is terminated</a:t>
+            </a:r>
+            <a:r>
+              <a:rPr lang="en-US" dirty="0" smtClean="0">
+                <a:sym typeface="Wingdings" panose="05000000000000000000" pitchFamily="2" charset="2"/>
+              </a:rPr>
+              <a:t>. Failure of a Test, does not impact other tests</a:t>
+            </a:r>
+          </a:p>
+          <a:p>
+            <a:pPr marL="457200" lvl="1" indent="0">
+              <a:buNone/>
+            </a:pPr>
+            <a:endParaRPr lang="en-US" dirty="0" smtClean="0"/>
+          </a:p>
+          <a:p>
+            <a:pPr lvl="1"/>
+            <a:endParaRPr lang="en-US" dirty="0" smtClean="0"/>
+          </a:p>
+        </p:txBody>
+      </p:sp>
+      <p:graphicFrame>
+        <p:nvGraphicFramePr>
+          <p:cNvPr id="4" name="Table 3"/>
+          <p:cNvGraphicFramePr>
+            <a:graphicFrameLocks noGrp="1"/>
+          </p:cNvGraphicFramePr>
+          <p:nvPr>
+            <p:extLst>
+              <p:ext uri="{D42A27DB-BD31-4B8C-83A1-F6EECF244321}">
+                <p14:modId xmlns:p14="http://schemas.microsoft.com/office/powerpoint/2010/main" val="2649222186"/>
+              </p:ext>
+            </p:extLst>
+          </p:nvPr>
+        </p:nvGraphicFramePr>
+        <p:xfrm>
+          <a:off x="1321721" y="3238423"/>
+          <a:ext cx="9917086" cy="3464560"/>
+        </p:xfrm>
+        <a:graphic>
+          <a:graphicData uri="http://schemas.openxmlformats.org/drawingml/2006/table">
+            <a:tbl>
+              <a:tblPr firstRow="1" bandRow="1">
+                <a:tableStyleId>{5C22544A-7EE6-4342-B048-85BDC9FD1C3A}</a:tableStyleId>
+              </a:tblPr>
+              <a:tblGrid>
+                <a:gridCol w="4958543">
+                  <a:extLst>
+                    <a:ext uri="{9D8B030D-6E8A-4147-A177-3AD203B41FA5}">
+                      <a16:colId xmlns:a16="http://schemas.microsoft.com/office/drawing/2014/main" val="2091253607"/>
+                    </a:ext>
+                  </a:extLst>
+                </a:gridCol>
+                <a:gridCol w="4958543">
+                  <a:extLst>
+                    <a:ext uri="{9D8B030D-6E8A-4147-A177-3AD203B41FA5}">
+                      <a16:colId xmlns:a16="http://schemas.microsoft.com/office/drawing/2014/main" val="1248970121"/>
+                    </a:ext>
+                  </a:extLst>
+                </a:gridCol>
+              </a:tblGrid>
+              <a:tr h="370840">
+                <a:tc>
+                  <a:txBody>
+                    <a:bodyPr/>
+                    <a:lstStyle/>
+                    <a:p>
+                      <a:pPr marL="0" marR="0" lvl="0" indent="0" algn="l" defTabSz="914400" rtl="0" eaLnBrk="1" fontAlgn="auto" latinLnBrk="0" hangingPunct="1">
+                        <a:lnSpc>
+                          <a:spcPct val="100000"/>
+                        </a:lnSpc>
+                        <a:spcBef>
+                          <a:spcPts val="0"/>
+                        </a:spcBef>
+                        <a:spcAft>
+                          <a:spcPts val="0"/>
+                        </a:spcAft>
+                        <a:buClrTx/>
+                        <a:buSzTx/>
+                        <a:buFontTx/>
+                        <a:buNone/>
+                        <a:tabLst/>
+                        <a:defRPr/>
+                      </a:pPr>
+                      <a:r>
+                        <a:rPr lang="en-US" dirty="0" smtClean="0"/>
+                        <a:t>Old style (</a:t>
+                      </a:r>
+                      <a:r>
+                        <a:rPr lang="en-US" b="1" dirty="0" smtClean="0"/>
+                        <a:t>Classic Model)</a:t>
+                      </a:r>
+                    </a:p>
+                    <a:p>
+                      <a:pPr marL="0" marR="0" lvl="0" indent="0" algn="l" defTabSz="914400" rtl="0" eaLnBrk="1" fontAlgn="auto" latinLnBrk="0" hangingPunct="1">
+                        <a:lnSpc>
+                          <a:spcPct val="100000"/>
+                        </a:lnSpc>
+                        <a:spcBef>
+                          <a:spcPts val="0"/>
+                        </a:spcBef>
+                        <a:spcAft>
+                          <a:spcPts val="0"/>
+                        </a:spcAft>
+                        <a:buClrTx/>
+                        <a:buSzTx/>
+                        <a:buFontTx/>
+                        <a:buNone/>
+                        <a:tabLst/>
+                        <a:defRPr/>
+                      </a:pPr>
+                      <a:r>
+                        <a:rPr lang="en-US" sz="1400" b="1" dirty="0" smtClean="0">
+                          <a:hlinkClick r:id="rId2"/>
+                        </a:rPr>
+                        <a:t>https://github.com/nunit/docs/wiki/Classic-Model</a:t>
+                      </a:r>
+                      <a:endParaRPr lang="en-US" sz="1400" b="1" dirty="0" smtClean="0"/>
+                    </a:p>
+                    <a:p>
+                      <a:pPr marL="0" marR="0" lvl="0" indent="0" algn="l" defTabSz="914400" rtl="0" eaLnBrk="1" fontAlgn="auto" latinLnBrk="0" hangingPunct="1">
+                        <a:lnSpc>
+                          <a:spcPct val="100000"/>
+                        </a:lnSpc>
+                        <a:spcBef>
+                          <a:spcPts val="0"/>
+                        </a:spcBef>
+                        <a:spcAft>
+                          <a:spcPts val="0"/>
+                        </a:spcAft>
+                        <a:buClrTx/>
+                        <a:buSzTx/>
+                        <a:buFontTx/>
+                        <a:buNone/>
+                        <a:tabLst/>
+                        <a:defRPr/>
+                      </a:pPr>
+                      <a:r>
+                        <a:rPr lang="en-US" sz="1400" b="1" dirty="0" smtClean="0">
+                          <a:hlinkClick r:id="rId3"/>
+                        </a:rPr>
+                        <a:t>https://github.com/nunit/docs/wiki/String-Assert</a:t>
+                      </a:r>
+                      <a:endParaRPr lang="en-US" sz="1400" b="1" dirty="0" smtClean="0"/>
+                    </a:p>
+                  </a:txBody>
+                  <a:tcPr/>
+                </a:tc>
+                <a:tc>
+                  <a:txBody>
+                    <a:bodyPr/>
+                    <a:lstStyle/>
+                    <a:p>
+                      <a:pPr marL="0" marR="0" lvl="0" indent="0" algn="l" defTabSz="914400" rtl="0" eaLnBrk="1" fontAlgn="auto" latinLnBrk="0" hangingPunct="1">
+                        <a:lnSpc>
+                          <a:spcPct val="100000"/>
+                        </a:lnSpc>
+                        <a:spcBef>
+                          <a:spcPts val="0"/>
+                        </a:spcBef>
+                        <a:spcAft>
+                          <a:spcPts val="0"/>
+                        </a:spcAft>
+                        <a:buClrTx/>
+                        <a:buSzTx/>
+                        <a:buFontTx/>
+                        <a:buNone/>
+                        <a:tabLst/>
+                        <a:defRPr/>
+                      </a:pPr>
+                      <a:r>
+                        <a:rPr lang="en-US" dirty="0" smtClean="0"/>
+                        <a:t>New style (</a:t>
+                      </a:r>
+                      <a:r>
+                        <a:rPr lang="en-US" b="1" dirty="0" smtClean="0"/>
+                        <a:t>Constraint Model)</a:t>
+                      </a:r>
+                    </a:p>
+                    <a:p>
+                      <a:pPr marL="0" marR="0" lvl="0" indent="0" algn="l" defTabSz="914400" rtl="0" eaLnBrk="1" fontAlgn="auto" latinLnBrk="0" hangingPunct="1">
+                        <a:lnSpc>
+                          <a:spcPct val="100000"/>
+                        </a:lnSpc>
+                        <a:spcBef>
+                          <a:spcPts val="0"/>
+                        </a:spcBef>
+                        <a:spcAft>
+                          <a:spcPts val="0"/>
+                        </a:spcAft>
+                        <a:buClrTx/>
+                        <a:buSzTx/>
+                        <a:buFontTx/>
+                        <a:buNone/>
+                        <a:tabLst/>
+                        <a:defRPr/>
+                      </a:pPr>
+                      <a:r>
+                        <a:rPr lang="en-US" sz="1400" b="1" dirty="0" smtClean="0">
+                          <a:hlinkClick r:id="rId4"/>
+                        </a:rPr>
+                        <a:t>https://github.com/nunit/docs/wiki/Constraint-Model</a:t>
+                      </a:r>
+                      <a:endParaRPr lang="en-US" sz="1400" b="1" dirty="0" smtClean="0"/>
+                    </a:p>
+                    <a:p>
+                      <a:pPr marL="0" marR="0" lvl="0" indent="0" algn="l" defTabSz="914400" rtl="0" eaLnBrk="1" fontAlgn="auto" latinLnBrk="0" hangingPunct="1">
+                        <a:lnSpc>
+                          <a:spcPct val="100000"/>
+                        </a:lnSpc>
+                        <a:spcBef>
+                          <a:spcPts val="0"/>
+                        </a:spcBef>
+                        <a:spcAft>
+                          <a:spcPts val="0"/>
+                        </a:spcAft>
+                        <a:buClrTx/>
+                        <a:buSzTx/>
+                        <a:buFontTx/>
+                        <a:buNone/>
+                        <a:tabLst/>
+                        <a:defRPr/>
+                      </a:pPr>
+                      <a:endParaRPr lang="en-US" sz="1400" b="1" dirty="0" smtClean="0"/>
+                    </a:p>
+                  </a:txBody>
+                  <a:tcPr/>
+                </a:tc>
+                <a:extLst>
+                  <a:ext uri="{0D108BD9-81ED-4DB2-BD59-A6C34878D82A}">
+                    <a16:rowId xmlns:a16="http://schemas.microsoft.com/office/drawing/2014/main" val="2658097805"/>
+                  </a:ext>
+                </a:extLst>
+              </a:tr>
+              <a:tr h="370840">
+                <a:tc>
+                  <a:txBody>
+                    <a:bodyPr/>
+                    <a:lstStyle/>
+                    <a:p>
+                      <a:r>
+                        <a:rPr lang="en-US" dirty="0" err="1" smtClean="0"/>
+                        <a:t>Assert.AreEqual</a:t>
+                      </a:r>
+                      <a:r>
+                        <a:rPr lang="en-US" dirty="0" smtClean="0"/>
+                        <a:t>(2+2,4);</a:t>
+                      </a:r>
+                      <a:endParaRPr lang="en-US" dirty="0"/>
+                    </a:p>
+                  </a:txBody>
+                  <a:tcPr/>
+                </a:tc>
+                <a:tc>
+                  <a:txBody>
+                    <a:bodyPr/>
+                    <a:lstStyle/>
+                    <a:p>
+                      <a:r>
+                        <a:rPr lang="en-US" dirty="0" err="1" smtClean="0"/>
+                        <a:t>Assert.That</a:t>
+                      </a:r>
+                      <a:r>
+                        <a:rPr lang="en-US" dirty="0" smtClean="0"/>
+                        <a:t>(2+2,</a:t>
+                      </a:r>
+                      <a:r>
+                        <a:rPr lang="en-US" baseline="0" dirty="0" smtClean="0"/>
+                        <a:t> </a:t>
+                      </a:r>
+                      <a:r>
+                        <a:rPr lang="en-US" baseline="0" dirty="0" err="1" smtClean="0"/>
+                        <a:t>Is.EqualTo</a:t>
+                      </a:r>
+                      <a:r>
+                        <a:rPr lang="en-US" baseline="0" dirty="0" smtClean="0"/>
+                        <a:t>(4));</a:t>
+                      </a:r>
+                      <a:endParaRPr lang="en-US" dirty="0"/>
+                    </a:p>
+                  </a:txBody>
+                  <a:tcPr/>
+                </a:tc>
+                <a:extLst>
+                  <a:ext uri="{0D108BD9-81ED-4DB2-BD59-A6C34878D82A}">
+                    <a16:rowId xmlns:a16="http://schemas.microsoft.com/office/drawing/2014/main" val="4284114611"/>
+                  </a:ext>
+                </a:extLst>
+              </a:tr>
+              <a:tr h="370840">
+                <a:tc>
+                  <a:txBody>
+                    <a:bodyPr/>
+                    <a:lstStyle/>
+                    <a:p>
+                      <a:r>
+                        <a:rPr lang="en-US" sz="1800" kern="1200" dirty="0" err="1" smtClean="0">
+                          <a:solidFill>
+                            <a:schemeClr val="dk1"/>
+                          </a:solidFill>
+                          <a:latin typeface="+mn-lt"/>
+                          <a:ea typeface="+mn-ea"/>
+                          <a:cs typeface="+mn-cs"/>
+                        </a:rPr>
+                        <a:t>StringAssert.Contains</a:t>
+                      </a:r>
+                      <a:r>
+                        <a:rPr lang="en-US" sz="1800" kern="1200" dirty="0" smtClean="0">
+                          <a:solidFill>
+                            <a:schemeClr val="dk1"/>
+                          </a:solidFill>
+                          <a:latin typeface="+mn-lt"/>
+                          <a:ea typeface="+mn-ea"/>
+                          <a:cs typeface="+mn-cs"/>
+                        </a:rPr>
+                        <a:t>("BC", "ABCD");</a:t>
+                      </a:r>
+                      <a:endParaRPr lang="en-US" dirty="0"/>
+                    </a:p>
+                  </a:txBody>
+                  <a:tcPr/>
+                </a:tc>
+                <a:tc>
+                  <a:txBody>
+                    <a:bodyPr/>
+                    <a:lstStyle/>
+                    <a:p>
+                      <a:r>
+                        <a:rPr lang="en-US" sz="1800" kern="1200" dirty="0" err="1" smtClean="0">
+                          <a:solidFill>
+                            <a:schemeClr val="dk1"/>
+                          </a:solidFill>
+                          <a:latin typeface="+mn-lt"/>
+                          <a:ea typeface="+mn-ea"/>
+                          <a:cs typeface="+mn-cs"/>
+                        </a:rPr>
+                        <a:t>Assert.That</a:t>
+                      </a:r>
+                      <a:r>
+                        <a:rPr lang="en-US" sz="1800" kern="1200" dirty="0" smtClean="0">
+                          <a:solidFill>
+                            <a:schemeClr val="dk1"/>
+                          </a:solidFill>
+                          <a:latin typeface="+mn-lt"/>
+                          <a:ea typeface="+mn-ea"/>
+                          <a:cs typeface="+mn-cs"/>
+                        </a:rPr>
+                        <a:t>("ABCD", </a:t>
+                      </a:r>
+                      <a:r>
+                        <a:rPr lang="en-US" sz="1800" kern="1200" dirty="0" err="1" smtClean="0">
+                          <a:solidFill>
+                            <a:schemeClr val="dk1"/>
+                          </a:solidFill>
+                          <a:latin typeface="+mn-lt"/>
+                          <a:ea typeface="+mn-ea"/>
+                          <a:cs typeface="+mn-cs"/>
+                        </a:rPr>
+                        <a:t>Does.Contain</a:t>
+                      </a:r>
+                      <a:r>
+                        <a:rPr lang="en-US" sz="1800" kern="1200" dirty="0" smtClean="0">
+                          <a:solidFill>
+                            <a:schemeClr val="dk1"/>
+                          </a:solidFill>
+                          <a:latin typeface="+mn-lt"/>
+                          <a:ea typeface="+mn-ea"/>
+                          <a:cs typeface="+mn-cs"/>
+                        </a:rPr>
+                        <a:t>("BC"));</a:t>
+                      </a:r>
+                      <a:endParaRPr lang="en-US" dirty="0"/>
+                    </a:p>
+                  </a:txBody>
+                  <a:tcPr/>
+                </a:tc>
+                <a:extLst>
+                  <a:ext uri="{0D108BD9-81ED-4DB2-BD59-A6C34878D82A}">
+                    <a16:rowId xmlns:a16="http://schemas.microsoft.com/office/drawing/2014/main" val="2197019940"/>
+                  </a:ext>
+                </a:extLst>
+              </a:tr>
+              <a:tr h="370840">
+                <a:tc>
+                  <a:txBody>
+                    <a:bodyPr/>
+                    <a:lstStyle/>
+                    <a:p>
+                      <a:pPr marL="0" marR="0" lvl="0" indent="0" algn="l" defTabSz="914400" rtl="0" eaLnBrk="1" fontAlgn="auto" latinLnBrk="0" hangingPunct="1">
+                        <a:lnSpc>
+                          <a:spcPct val="100000"/>
+                        </a:lnSpc>
+                        <a:spcBef>
+                          <a:spcPts val="0"/>
+                        </a:spcBef>
+                        <a:spcAft>
+                          <a:spcPts val="0"/>
+                        </a:spcAft>
+                        <a:buClrTx/>
+                        <a:buSzTx/>
+                        <a:buFontTx/>
+                        <a:buNone/>
+                        <a:tabLst/>
+                        <a:defRPr/>
+                      </a:pPr>
+                      <a:r>
+                        <a:rPr lang="en-US" sz="1800" kern="1200" dirty="0" err="1" smtClean="0">
+                          <a:solidFill>
+                            <a:schemeClr val="dk1"/>
+                          </a:solidFill>
+                          <a:latin typeface="+mn-lt"/>
+                          <a:ea typeface="+mn-ea"/>
+                          <a:cs typeface="+mn-cs"/>
+                        </a:rPr>
+                        <a:t>StringAssert.EndsWith</a:t>
+                      </a:r>
+                      <a:r>
+                        <a:rPr lang="en-US" sz="1800" kern="1200" dirty="0" smtClean="0">
+                          <a:solidFill>
+                            <a:schemeClr val="dk1"/>
+                          </a:solidFill>
+                          <a:latin typeface="+mn-lt"/>
+                          <a:ea typeface="+mn-ea"/>
+                          <a:cs typeface="+mn-cs"/>
+                        </a:rPr>
+                        <a:t>("BCD", "ABCD");</a:t>
+                      </a:r>
+                      <a:endParaRPr lang="en-US" dirty="0" smtClean="0"/>
+                    </a:p>
+                  </a:txBody>
+                  <a:tcPr/>
+                </a:tc>
+                <a:tc>
+                  <a:txBody>
+                    <a:bodyPr/>
+                    <a:lstStyle/>
+                    <a:p>
+                      <a:pPr marL="0" marR="0" lvl="0" indent="0" algn="l" defTabSz="914400" rtl="0" eaLnBrk="1" fontAlgn="auto" latinLnBrk="0" hangingPunct="1">
+                        <a:lnSpc>
+                          <a:spcPct val="100000"/>
+                        </a:lnSpc>
+                        <a:spcBef>
+                          <a:spcPts val="0"/>
+                        </a:spcBef>
+                        <a:spcAft>
+                          <a:spcPts val="0"/>
+                        </a:spcAft>
+                        <a:buClrTx/>
+                        <a:buSzTx/>
+                        <a:buFontTx/>
+                        <a:buNone/>
+                        <a:tabLst/>
+                        <a:defRPr/>
+                      </a:pPr>
+                      <a:r>
+                        <a:rPr lang="en-US" sz="1800" kern="1200" dirty="0" err="1" smtClean="0">
+                          <a:solidFill>
+                            <a:schemeClr val="dk1"/>
+                          </a:solidFill>
+                          <a:latin typeface="+mn-lt"/>
+                          <a:ea typeface="+mn-ea"/>
+                          <a:cs typeface="+mn-cs"/>
+                        </a:rPr>
+                        <a:t>Assert.That</a:t>
+                      </a:r>
+                      <a:r>
+                        <a:rPr lang="en-US" sz="1800" kern="1200" dirty="0" smtClean="0">
+                          <a:solidFill>
+                            <a:schemeClr val="dk1"/>
+                          </a:solidFill>
+                          <a:latin typeface="+mn-lt"/>
+                          <a:ea typeface="+mn-ea"/>
+                          <a:cs typeface="+mn-cs"/>
+                        </a:rPr>
+                        <a:t>("ABCD", </a:t>
+                      </a:r>
+                      <a:r>
+                        <a:rPr lang="en-US" sz="1800" kern="1200" dirty="0" err="1" smtClean="0">
+                          <a:solidFill>
+                            <a:schemeClr val="dk1"/>
+                          </a:solidFill>
+                          <a:latin typeface="+mn-lt"/>
+                          <a:ea typeface="+mn-ea"/>
+                          <a:cs typeface="+mn-cs"/>
+                        </a:rPr>
+                        <a:t>Does.EndWith</a:t>
+                      </a:r>
+                      <a:r>
+                        <a:rPr lang="en-US" sz="1800" kern="1200" dirty="0" smtClean="0">
+                          <a:solidFill>
+                            <a:schemeClr val="dk1"/>
+                          </a:solidFill>
+                          <a:latin typeface="+mn-lt"/>
+                          <a:ea typeface="+mn-ea"/>
+                          <a:cs typeface="+mn-cs"/>
+                        </a:rPr>
+                        <a:t>("BCD"));</a:t>
+                      </a:r>
+                      <a:endParaRPr lang="en-US" dirty="0" smtClean="0"/>
+                    </a:p>
+                  </a:txBody>
+                  <a:tcPr/>
+                </a:tc>
+                <a:extLst>
+                  <a:ext uri="{0D108BD9-81ED-4DB2-BD59-A6C34878D82A}">
+                    <a16:rowId xmlns:a16="http://schemas.microsoft.com/office/drawing/2014/main" val="230179102"/>
+                  </a:ext>
+                </a:extLst>
+              </a:tr>
+              <a:tr h="370840">
+                <a:tc>
+                  <a:txBody>
+                    <a:bodyPr/>
+                    <a:lstStyle/>
+                    <a:p>
+                      <a:r>
+                        <a:rPr lang="en-US" dirty="0" err="1" smtClean="0"/>
+                        <a:t>Assert.GreaterOrEqual</a:t>
+                      </a:r>
+                      <a:r>
+                        <a:rPr lang="en-US" dirty="0" smtClean="0"/>
+                        <a:t>(567, 100);</a:t>
+                      </a:r>
+                      <a:endParaRPr lang="en-US" dirty="0"/>
+                    </a:p>
+                  </a:txBody>
+                  <a:tcPr/>
+                </a:tc>
+                <a:tc>
+                  <a:txBody>
+                    <a:bodyPr/>
+                    <a:lstStyle/>
+                    <a:p>
+                      <a:r>
+                        <a:rPr lang="en-US" sz="1800" kern="1200" dirty="0" err="1" smtClean="0">
+                          <a:solidFill>
+                            <a:schemeClr val="dk1"/>
+                          </a:solidFill>
+                          <a:latin typeface="+mn-lt"/>
+                          <a:ea typeface="+mn-ea"/>
+                          <a:cs typeface="+mn-cs"/>
+                        </a:rPr>
+                        <a:t>Assert.That</a:t>
+                      </a:r>
+                      <a:r>
+                        <a:rPr lang="en-US" sz="1800" kern="1200" dirty="0" smtClean="0">
+                          <a:solidFill>
+                            <a:schemeClr val="dk1"/>
+                          </a:solidFill>
+                          <a:latin typeface="+mn-lt"/>
+                          <a:ea typeface="+mn-ea"/>
+                          <a:cs typeface="+mn-cs"/>
+                        </a:rPr>
+                        <a:t>(567, </a:t>
+                      </a:r>
+                      <a:r>
+                        <a:rPr lang="en-US" sz="1800" kern="1200" dirty="0" err="1" smtClean="0">
+                          <a:solidFill>
+                            <a:schemeClr val="dk1"/>
+                          </a:solidFill>
+                          <a:latin typeface="+mn-lt"/>
+                          <a:ea typeface="+mn-ea"/>
+                          <a:cs typeface="+mn-cs"/>
+                        </a:rPr>
+                        <a:t>Is.GreaterThanOrEqualTo</a:t>
+                      </a:r>
+                      <a:r>
+                        <a:rPr lang="en-US" sz="1800" kern="1200" dirty="0" smtClean="0">
+                          <a:solidFill>
+                            <a:schemeClr val="dk1"/>
+                          </a:solidFill>
+                          <a:latin typeface="+mn-lt"/>
+                          <a:ea typeface="+mn-ea"/>
+                          <a:cs typeface="+mn-cs"/>
+                        </a:rPr>
+                        <a:t>(100));</a:t>
+                      </a:r>
+                      <a:endParaRPr lang="en-US" dirty="0"/>
+                    </a:p>
+                  </a:txBody>
+                  <a:tcPr/>
+                </a:tc>
+                <a:extLst>
+                  <a:ext uri="{0D108BD9-81ED-4DB2-BD59-A6C34878D82A}">
+                    <a16:rowId xmlns:a16="http://schemas.microsoft.com/office/drawing/2014/main" val="3597729410"/>
+                  </a:ext>
+                </a:extLst>
+              </a:tr>
+              <a:tr h="370840">
+                <a:tc>
+                  <a:txBody>
+                    <a:bodyPr/>
+                    <a:lstStyle/>
+                    <a:p>
+                      <a:endParaRPr lang="en-US" dirty="0"/>
+                    </a:p>
+                  </a:txBody>
+                  <a:tcPr/>
+                </a:tc>
+                <a:tc>
+                  <a:txBody>
+                    <a:bodyPr/>
+                    <a:lstStyle/>
+                    <a:p>
+                      <a:r>
+                        <a:rPr lang="en-US" dirty="0" err="1" smtClean="0"/>
+                        <a:t>int</a:t>
+                      </a:r>
+                      <a:r>
+                        <a:rPr lang="en-US" dirty="0" smtClean="0"/>
+                        <a:t>[] array = new </a:t>
+                      </a:r>
+                      <a:r>
+                        <a:rPr lang="en-US" dirty="0" err="1" smtClean="0"/>
+                        <a:t>int</a:t>
+                      </a:r>
+                      <a:r>
+                        <a:rPr lang="en-US" dirty="0" smtClean="0"/>
+                        <a:t>[] { 1, 2, 3 }; </a:t>
+                      </a:r>
+                    </a:p>
+                    <a:p>
+                      <a:pPr marL="0" marR="0" lvl="0" indent="0" algn="l" defTabSz="914400" rtl="0" eaLnBrk="1" fontAlgn="auto" latinLnBrk="0" hangingPunct="1">
+                        <a:lnSpc>
+                          <a:spcPct val="100000"/>
+                        </a:lnSpc>
+                        <a:spcBef>
+                          <a:spcPts val="0"/>
+                        </a:spcBef>
+                        <a:spcAft>
+                          <a:spcPts val="0"/>
+                        </a:spcAft>
+                        <a:buClrTx/>
+                        <a:buSzTx/>
+                        <a:buFontTx/>
+                        <a:buNone/>
+                        <a:tabLst/>
+                        <a:defRPr/>
+                      </a:pPr>
+                      <a:r>
+                        <a:rPr lang="en-US" dirty="0" err="1" smtClean="0"/>
+                        <a:t>Assert.That</a:t>
+                      </a:r>
+                      <a:r>
+                        <a:rPr lang="en-US" dirty="0" smtClean="0"/>
+                        <a:t>( array, </a:t>
+                      </a:r>
+                      <a:r>
+                        <a:rPr lang="en-US" dirty="0" err="1" smtClean="0"/>
+                        <a:t>Has.Exactly</a:t>
+                      </a:r>
+                      <a:r>
+                        <a:rPr lang="en-US" dirty="0" smtClean="0"/>
+                        <a:t>(1).</a:t>
+                      </a:r>
+                      <a:r>
+                        <a:rPr lang="en-US" dirty="0" err="1" smtClean="0"/>
+                        <a:t>EqualTo</a:t>
+                      </a:r>
+                      <a:r>
+                        <a:rPr lang="en-US" dirty="0" smtClean="0"/>
+                        <a:t>(3) ); </a:t>
+                      </a:r>
+                      <a:r>
+                        <a:rPr lang="en-US" dirty="0" err="1" smtClean="0"/>
+                        <a:t>Assert.That</a:t>
+                      </a:r>
+                      <a:r>
+                        <a:rPr lang="en-US" dirty="0" smtClean="0"/>
+                        <a:t>( array, </a:t>
+                      </a:r>
+                      <a:r>
+                        <a:rPr lang="en-US" dirty="0" err="1" smtClean="0"/>
+                        <a:t>Has.All.Positive</a:t>
+                      </a:r>
+                      <a:r>
+                        <a:rPr lang="en-US" dirty="0" smtClean="0"/>
+                        <a:t> );</a:t>
+                      </a:r>
+                    </a:p>
+                    <a:p>
+                      <a:endParaRPr lang="en-US" dirty="0"/>
+                    </a:p>
+                  </a:txBody>
+                  <a:tcPr/>
+                </a:tc>
+                <a:extLst>
+                  <a:ext uri="{0D108BD9-81ED-4DB2-BD59-A6C34878D82A}">
+                    <a16:rowId xmlns:a16="http://schemas.microsoft.com/office/drawing/2014/main" val="2012388287"/>
+                  </a:ext>
+                </a:extLst>
+              </a:tr>
+            </a:tbl>
+          </a:graphicData>
+        </a:graphic>
+      </p:graphicFrame>
+    </p:spTree>
+    <p:extLst>
+      <p:ext uri="{BB962C8B-B14F-4D97-AF65-F5344CB8AC3E}">
+        <p14:creationId xmlns:p14="http://schemas.microsoft.com/office/powerpoint/2010/main" val="3642355939"/>
+      </p:ext>
+    </p:extLst>
+  </p:cSld>
+  <p:clrMapOvr>
+    <a:masterClrMapping/>
+  </p:clrMapOvr>
+  <p:timing>
+    <p:tnLst>
+      <p:par>
+        <p:cTn id="1" dur="indefinite" restart="never" nodeType="tmRoot"/>
+      </p:par>
+    </p:tnLst>
+  </p:timing>
+</p:sld>
+</file>
+
+<file path=ppt/slides/slide13.xml><?xml version="1.0" encoding="utf-8"?>
+<p:sld xmlns:a="http://schemas.openxmlformats.org/drawingml/2006/main" xmlns:r="http://schemas.openxmlformats.org/officeDocument/2006/relationships" xmlns:p="http://schemas.openxmlformats.org/presentationml/2006/main">
+  <p:cSld>
+    <p:spTree>
+      <p:nvGrpSpPr>
+        <p:cNvPr id="1" name=""/>
+        <p:cNvGrpSpPr/>
+        <p:nvPr/>
+      </p:nvGrpSpPr>
+      <p:grpSpPr>
+        <a:xfrm>
+          <a:off x="0" y="0"/>
+          <a:ext cx="0" cy="0"/>
+          <a:chOff x="0" y="0"/>
+          <a:chExt cx="0" cy="0"/>
+        </a:xfrm>
+      </p:grpSpPr>
+      <p:sp>
+        <p:nvSpPr>
+          <p:cNvPr id="2" name="Title 1"/>
+          <p:cNvSpPr>
+            <a:spLocks noGrp="1"/>
+          </p:cNvSpPr>
+          <p:nvPr>
+            <p:ph type="title"/>
+          </p:nvPr>
+        </p:nvSpPr>
+        <p:spPr/>
+        <p:txBody>
           <a:bodyPr/>
           <a:lstStyle/>
           <a:p>
             <a:pPr algn="ctr"/>
             <a:r>
-              <a:rPr lang="en-US" dirty="0" smtClean="0"/>
-              <a:t>Sources: </a:t>
-            </a:r>
-            <a:endParaRPr lang="bg-BG" dirty="0"/>
-          </a:p>
-        </p:txBody>
-      </p:sp>
-      <p:sp>
-        <p:nvSpPr>
-          <p:cNvPr id="3" name="Rectangle 2"/>
-          <p:cNvSpPr/>
-          <p:nvPr/>
+              <a:rPr lang="en-US" dirty="0" err="1"/>
+              <a:t>Nunit</a:t>
+            </a:r>
+            <a:r>
+              <a:rPr lang="en-US" dirty="0"/>
+              <a:t> </a:t>
+            </a:r>
+            <a:r>
+              <a:rPr lang="en-US" dirty="0" smtClean="0"/>
+              <a:t>Assertions (2)</a:t>
+            </a:r>
+            <a:endParaRPr lang="en-US" dirty="0"/>
+          </a:p>
+        </p:txBody>
+      </p:sp>
+      <p:sp>
+        <p:nvSpPr>
+          <p:cNvPr id="3" name="Content Placeholder 2"/>
+          <p:cNvSpPr>
+            <a:spLocks noGrp="1"/>
+          </p:cNvSpPr>
+          <p:nvPr>
+            <p:ph idx="1"/>
+          </p:nvPr>
         </p:nvSpPr>
         <p:spPr>
           <a:xfrm>
-            <a:off x="1504604" y="1962929"/>
-            <a:ext cx="9601200" cy="369332"/>
+            <a:off x="838200" y="1903615"/>
+            <a:ext cx="10708178" cy="4305992"/>
+          </a:xfrm>
+        </p:spPr>
+        <p:txBody>
+          <a:bodyPr>
+            <a:normAutofit/>
+          </a:bodyPr>
+          <a:lstStyle/>
+          <a:p>
+            <a:pPr lvl="1"/>
+            <a:r>
+              <a:rPr lang="en-US" dirty="0" err="1" smtClean="0"/>
+              <a:t>Assert.Pass</a:t>
+            </a:r>
+            <a:r>
+              <a:rPr lang="en-US" dirty="0" smtClean="0"/>
+              <a:t>();</a:t>
+            </a:r>
+            <a:endParaRPr lang="en-US" dirty="0"/>
+          </a:p>
+          <a:p>
+            <a:pPr lvl="1"/>
+            <a:r>
+              <a:rPr lang="en-US" dirty="0" err="1" smtClean="0"/>
+              <a:t>Assert.Fail</a:t>
+            </a:r>
+            <a:r>
+              <a:rPr lang="en-US" dirty="0" smtClean="0"/>
+              <a:t>();</a:t>
+            </a:r>
+            <a:endParaRPr lang="en-US" dirty="0"/>
+          </a:p>
+          <a:p>
+            <a:pPr lvl="1"/>
+            <a:r>
+              <a:rPr lang="en-US" dirty="0" err="1" smtClean="0"/>
+              <a:t>Assert.Ignore</a:t>
+            </a:r>
+            <a:r>
+              <a:rPr lang="en-US" dirty="0" smtClean="0"/>
+              <a:t>();</a:t>
+            </a:r>
+            <a:endParaRPr lang="en-US" dirty="0"/>
+          </a:p>
+          <a:p>
+            <a:pPr lvl="1"/>
+            <a:r>
+              <a:rPr lang="en-US" dirty="0" err="1" smtClean="0"/>
+              <a:t>Assert.Inconclusive</a:t>
+            </a:r>
+            <a:r>
+              <a:rPr lang="en-US" dirty="0" smtClean="0"/>
+              <a:t>();</a:t>
+            </a:r>
+          </a:p>
+          <a:p>
+            <a:pPr marL="457200" lvl="1" indent="0">
+              <a:buNone/>
+            </a:pPr>
+            <a:endParaRPr lang="en-US" dirty="0"/>
+          </a:p>
+          <a:p>
+            <a:pPr marL="457200" lvl="1" indent="0">
+              <a:buNone/>
+            </a:pPr>
+            <a:r>
+              <a:rPr lang="en-US" dirty="0" smtClean="0"/>
+              <a:t>Add failing message</a:t>
+            </a:r>
+          </a:p>
+          <a:p>
+            <a:pPr lvl="1"/>
+            <a:r>
+              <a:rPr lang="en-US" dirty="0" smtClean="0"/>
+              <a:t>Assert.AreEqual(2+2, 5, “Of course they are not equal”);</a:t>
+            </a:r>
+            <a:endParaRPr lang="en-US" dirty="0"/>
+          </a:p>
+          <a:p>
+            <a:pPr lvl="1"/>
+            <a:r>
+              <a:rPr lang="en-US" dirty="0" err="1"/>
+              <a:t>Assert.That</a:t>
+            </a:r>
+            <a:r>
+              <a:rPr lang="en-US" dirty="0"/>
+              <a:t>(2+2, </a:t>
+            </a:r>
+            <a:r>
+              <a:rPr lang="en-US" dirty="0" err="1"/>
+              <a:t>Is.EqualTo</a:t>
+            </a:r>
+            <a:r>
+              <a:rPr lang="en-US" dirty="0"/>
+              <a:t>(4</a:t>
+            </a:r>
+            <a:r>
+              <a:rPr lang="en-US" dirty="0" smtClean="0"/>
+              <a:t>), </a:t>
+            </a:r>
+            <a:r>
+              <a:rPr lang="en-US" dirty="0"/>
+              <a:t>“Of course they are not equal</a:t>
+            </a:r>
+            <a:r>
+              <a:rPr lang="en-US" dirty="0" smtClean="0"/>
+              <a:t>”);</a:t>
+            </a:r>
+          </a:p>
+          <a:p>
+            <a:pPr lvl="1"/>
+            <a:r>
+              <a:rPr lang="en-US" dirty="0" err="1"/>
+              <a:t>Assert.Ignore</a:t>
+            </a:r>
+            <a:r>
+              <a:rPr lang="en-US" dirty="0" smtClean="0"/>
+              <a:t>(“We are not testing this on Monday”);</a:t>
+            </a:r>
+            <a:endParaRPr lang="en-US" dirty="0"/>
+          </a:p>
+          <a:p>
+            <a:pPr marL="457200" lvl="1" indent="0">
+              <a:buNone/>
+            </a:pPr>
+            <a:endParaRPr lang="en-US" dirty="0"/>
+          </a:p>
+          <a:p>
+            <a:pPr marL="457200" lvl="1" indent="0">
+              <a:buNone/>
+            </a:pPr>
+            <a:endParaRPr lang="en-US" dirty="0" smtClean="0"/>
+          </a:p>
+        </p:txBody>
+      </p:sp>
+    </p:spTree>
+    <p:extLst>
+      <p:ext uri="{BB962C8B-B14F-4D97-AF65-F5344CB8AC3E}">
+        <p14:creationId xmlns:p14="http://schemas.microsoft.com/office/powerpoint/2010/main" val="3249704798"/>
+      </p:ext>
+    </p:extLst>
+  </p:cSld>
+  <p:clrMapOvr>
+    <a:masterClrMapping/>
+  </p:clrMapOvr>
+  <p:timing>
+    <p:tnLst>
+      <p:par>
+        <p:cTn id="1" dur="indefinite" restart="never" nodeType="tmRoot"/>
+      </p:par>
+    </p:tnLst>
+  </p:timing>
+</p:sld>
+</file>
+
+<file path=ppt/slides/slide14.xml><?xml version="1.0" encoding="utf-8"?>
+<p:sld xmlns:a="http://schemas.openxmlformats.org/drawingml/2006/main" xmlns:r="http://schemas.openxmlformats.org/officeDocument/2006/relationships" xmlns:p="http://schemas.openxmlformats.org/presentationml/2006/main">
+  <p:cSld>
+    <p:spTree>
+      <p:nvGrpSpPr>
+        <p:cNvPr id="1" name=""/>
+        <p:cNvGrpSpPr/>
+        <p:nvPr/>
+      </p:nvGrpSpPr>
+      <p:grpSpPr>
+        <a:xfrm>
+          <a:off x="0" y="0"/>
+          <a:ext cx="0" cy="0"/>
+          <a:chOff x="0" y="0"/>
+          <a:chExt cx="0" cy="0"/>
+        </a:xfrm>
+      </p:grpSpPr>
+      <p:sp>
+        <p:nvSpPr>
+          <p:cNvPr id="2" name="Title 1"/>
+          <p:cNvSpPr>
+            <a:spLocks noGrp="1"/>
+          </p:cNvSpPr>
+          <p:nvPr>
+            <p:ph type="title"/>
+          </p:nvPr>
+        </p:nvSpPr>
+        <p:spPr>
+          <a:xfrm>
+            <a:off x="838200" y="365125"/>
+            <a:ext cx="10515600" cy="1862686"/>
+          </a:xfrm>
+        </p:spPr>
+        <p:txBody>
+          <a:bodyPr/>
+          <a:lstStyle/>
+          <a:p>
+            <a:pPr algn="ctr"/>
+            <a:r>
+              <a:rPr lang="en-US" dirty="0" err="1"/>
+              <a:t>Nunit</a:t>
+            </a:r>
+            <a:r>
+              <a:rPr lang="en-US" dirty="0"/>
+              <a:t> </a:t>
+            </a:r>
+            <a:r>
+              <a:rPr lang="en-US" dirty="0" smtClean="0"/>
+              <a:t>Assertions (3)</a:t>
+            </a:r>
+            <a:br>
+              <a:rPr lang="en-US" dirty="0" smtClean="0"/>
+            </a:br>
+            <a:r>
+              <a:rPr lang="en-US" dirty="0" smtClean="0"/>
+              <a:t>Warnings</a:t>
+            </a:r>
+            <a:endParaRPr lang="en-US" dirty="0"/>
+          </a:p>
+        </p:txBody>
+      </p:sp>
+      <p:sp>
+        <p:nvSpPr>
+          <p:cNvPr id="3" name="Content Placeholder 2"/>
+          <p:cNvSpPr>
+            <a:spLocks noGrp="1"/>
+          </p:cNvSpPr>
+          <p:nvPr>
+            <p:ph idx="1"/>
+          </p:nvPr>
+        </p:nvSpPr>
+        <p:spPr>
+          <a:xfrm>
+            <a:off x="838200" y="1903615"/>
+            <a:ext cx="10708178" cy="4305992"/>
+          </a:xfrm>
+        </p:spPr>
+        <p:txBody>
+          <a:bodyPr>
+            <a:normAutofit/>
+          </a:bodyPr>
+          <a:lstStyle/>
+          <a:p>
+            <a:pPr lvl="1"/>
+            <a:r>
+              <a:rPr lang="en-US" dirty="0" smtClean="0"/>
+              <a:t>Anything that you assert, you can warn (new syntax): </a:t>
+            </a:r>
+          </a:p>
+          <a:p>
+            <a:pPr lvl="2"/>
+            <a:r>
+              <a:rPr lang="en-US" dirty="0">
+                <a:hlinkClick r:id="rId2"/>
+              </a:rPr>
+              <a:t>https://</a:t>
+            </a:r>
+            <a:r>
+              <a:rPr lang="en-US" dirty="0" smtClean="0">
+                <a:hlinkClick r:id="rId2"/>
+              </a:rPr>
+              <a:t>github.com/nunit/docs/wiki/Warnings</a:t>
+            </a:r>
+            <a:r>
+              <a:rPr lang="en-US" dirty="0" smtClean="0"/>
+              <a:t>:</a:t>
+            </a:r>
+          </a:p>
+          <a:p>
+            <a:pPr marL="914400" lvl="2" indent="0">
+              <a:buNone/>
+            </a:pPr>
+            <a:r>
+              <a:rPr lang="en-US" dirty="0"/>
+              <a:t>“Sometimes - especially in integration testing - it's desirable </a:t>
+            </a:r>
+            <a:r>
+              <a:rPr lang="en-US" sz="2800" b="1" dirty="0"/>
+              <a:t>to give a warning message but continue execution</a:t>
+            </a:r>
+            <a:r>
+              <a:rPr lang="en-US" dirty="0"/>
+              <a:t>. Beginning with release 3.6, </a:t>
+            </a:r>
+            <a:r>
+              <a:rPr lang="en-US" dirty="0" err="1"/>
+              <a:t>NUnit</a:t>
+            </a:r>
+            <a:r>
+              <a:rPr lang="en-US" dirty="0"/>
+              <a:t> supports this with the Warn </a:t>
+            </a:r>
+            <a:r>
+              <a:rPr lang="en-US" dirty="0" smtClean="0"/>
+              <a:t>class”</a:t>
+            </a:r>
+            <a:endParaRPr lang="en-US" dirty="0"/>
+          </a:p>
+          <a:p>
+            <a:pPr marL="457200" lvl="1" indent="0">
+              <a:buNone/>
+            </a:pPr>
+            <a:r>
+              <a:rPr lang="en-US" dirty="0"/>
+              <a:t> </a:t>
+            </a:r>
+            <a:endParaRPr lang="en-US" dirty="0" smtClean="0"/>
+          </a:p>
+          <a:p>
+            <a:pPr marL="457200" lvl="1" indent="0">
+              <a:buNone/>
+            </a:pPr>
+            <a:r>
+              <a:rPr lang="en-US" dirty="0"/>
+              <a:t> </a:t>
+            </a:r>
+            <a:r>
+              <a:rPr lang="en-US" dirty="0" err="1"/>
+              <a:t>Warn.If</a:t>
+            </a:r>
+            <a:r>
+              <a:rPr lang="en-US" dirty="0"/>
+              <a:t>(2+2, </a:t>
+            </a:r>
+            <a:r>
+              <a:rPr lang="en-US" dirty="0" err="1" smtClean="0"/>
+              <a:t>Is.EqualTo</a:t>
+            </a:r>
+            <a:r>
+              <a:rPr lang="en-US" dirty="0" smtClean="0"/>
+              <a:t>(5));</a:t>
+            </a:r>
+          </a:p>
+          <a:p>
+            <a:pPr marL="457200" lvl="1" indent="0">
+              <a:buNone/>
+            </a:pPr>
+            <a:r>
+              <a:rPr lang="en-US" dirty="0"/>
+              <a:t> </a:t>
+            </a:r>
+            <a:r>
+              <a:rPr lang="en-US" dirty="0" err="1"/>
+              <a:t>Warn.If</a:t>
+            </a:r>
+            <a:r>
+              <a:rPr lang="en-US" dirty="0"/>
+              <a:t>(2+2, </a:t>
+            </a:r>
+            <a:r>
+              <a:rPr lang="en-US" dirty="0" err="1"/>
+              <a:t>Is.Not.EqualTo</a:t>
+            </a:r>
+            <a:r>
+              <a:rPr lang="en-US" dirty="0"/>
+              <a:t>(4</a:t>
+            </a:r>
+            <a:r>
+              <a:rPr lang="en-US" dirty="0" smtClean="0"/>
+              <a:t>));</a:t>
+            </a:r>
+          </a:p>
+          <a:p>
+            <a:pPr marL="457200" lvl="1" indent="0">
+              <a:buNone/>
+            </a:pPr>
+            <a:r>
+              <a:rPr lang="en-US" dirty="0" smtClean="0"/>
+              <a:t> </a:t>
+            </a:r>
+            <a:r>
+              <a:rPr lang="en-US" dirty="0" err="1" smtClean="0"/>
+              <a:t>Warn.Unless</a:t>
+            </a:r>
+            <a:r>
+              <a:rPr lang="en-US" dirty="0" smtClean="0"/>
+              <a:t>(2+2 == 4);</a:t>
+            </a:r>
+            <a:endParaRPr lang="en-US" dirty="0"/>
+          </a:p>
+          <a:p>
+            <a:pPr marL="457200" lvl="1" indent="0">
+              <a:buNone/>
+            </a:pPr>
+            <a:endParaRPr lang="en-US" dirty="0" smtClean="0"/>
+          </a:p>
+        </p:txBody>
+      </p:sp>
+      <p:sp>
+        <p:nvSpPr>
+          <p:cNvPr id="6" name="Rectangle 3"/>
+          <p:cNvSpPr>
+            <a:spLocks noChangeArrowheads="1"/>
+          </p:cNvSpPr>
+          <p:nvPr/>
+        </p:nvSpPr>
+        <p:spPr bwMode="auto">
+          <a:xfrm>
+            <a:off x="0" y="0"/>
+            <a:ext cx="12192000" cy="457200"/>
           </a:xfrm>
           <a:prstGeom prst="rect">
             <a:avLst/>
           </a:prstGeom>
+          <a:noFill/>
+          <a:ln>
+            <a:noFill/>
+          </a:ln>
+          <a:effectLst/>
+          <a:extLst>
+            <a:ext uri="{909E8E84-426E-40DD-AFC4-6F175D3DCCD1}">
+              <a14:hiddenFill xmlns:a14="http://schemas.microsoft.com/office/drawing/2010/main">
+                <a:solidFill>
+                  <a:schemeClr val="accent1"/>
+                </a:solidFill>
+              </a14:hiddenFill>
+            </a:ext>
+            <a:ext uri="{91240B29-F687-4F45-9708-019B960494DF}">
+              <a14:hiddenLine xmlns:a14="http://schemas.microsoft.com/office/drawing/2010/main" w="9525">
+                <a:solidFill>
+                  <a:schemeClr val="tx1"/>
+                </a:solidFill>
+                <a:miter lim="800000"/>
+                <a:headEnd/>
+                <a:tailEnd/>
+              </a14:hiddenLine>
+            </a:ext>
+            <a:ext uri="{AF507438-7753-43E0-B8FC-AC1667EBCBE1}">
+              <a14:hiddenEffects xmlns:a14="http://schemas.microsoft.com/office/drawing/2010/main">
+                <a:effectLst>
+                  <a:outerShdw dist="35921" dir="2700000" algn="ctr" rotWithShape="0">
+                    <a:schemeClr val="bg2"/>
+                  </a:outerShdw>
+                </a:effectLst>
+              </a14:hiddenEffects>
+            </a:ext>
+          </a:extLst>
         </p:spPr>
         <p:txBody>
-          <a:bodyPr wrap="square">
+          <a:bodyPr vert="horz" wrap="none" lIns="91440" tIns="45720" rIns="91440" bIns="45720" numCol="1" anchor="ctr" anchorCtr="0" compatLnSpc="1">
+            <a:prstTxWarp prst="textNoShape">
+              <a:avLst/>
+            </a:prstTxWarp>
             <a:spAutoFit/>
           </a:bodyPr>
           <a:lstStyle/>
           <a:p>
-            <a:r>
-              <a:rPr lang="en-US" dirty="0" smtClean="0"/>
-              <a:t>1. https</a:t>
-            </a:r>
-            <a:r>
-              <a:rPr lang="en-US" dirty="0"/>
-              <a:t>://github.com/nunit/docs</a:t>
-            </a:r>
+            <a:pPr marL="0" marR="0" lvl="0" indent="0" algn="l" defTabSz="914400" rtl="0" eaLnBrk="0" fontAlgn="base" latinLnBrk="0" hangingPunct="0">
+              <a:lnSpc>
+                <a:spcPct val="100000"/>
+              </a:lnSpc>
+              <a:spcBef>
+                <a:spcPct val="0"/>
+              </a:spcBef>
+              <a:spcAft>
+                <a:spcPct val="0"/>
+              </a:spcAft>
+              <a:buClrTx/>
+              <a:buSzTx/>
+              <a:buFontTx/>
+              <a:buNone/>
+              <a:tabLst/>
+            </a:pPr>
+            <a:r>
+              <a:rPr kumimoji="0" lang="en-US" altLang="en-US" sz="1000" b="0" i="0" u="none" strike="noStrike" cap="none" normalizeH="0" baseline="0" smtClean="0">
+                <a:ln>
+                  <a:noFill/>
+                </a:ln>
+                <a:solidFill>
+                  <a:schemeClr val="tx1"/>
+                </a:solidFill>
+                <a:effectLst/>
+                <a:latin typeface="Arial Unicode MS"/>
+              </a:rPr>
+              <a:t>Warn.Unless(2+2 == 5);</a:t>
+            </a:r>
+            <a:r>
+              <a:rPr kumimoji="0" lang="en-US" altLang="en-US" sz="800" b="0" i="0" u="none" strike="noStrike" cap="none" normalizeH="0" baseline="0" smtClean="0">
+                <a:ln>
+                  <a:noFill/>
+                </a:ln>
+                <a:solidFill>
+                  <a:schemeClr val="tx1"/>
+                </a:solidFill>
+                <a:effectLst/>
+              </a:rPr>
+              <a:t> </a:t>
+            </a:r>
+            <a:endParaRPr kumimoji="0" lang="en-US" altLang="en-US" sz="1800" b="0" i="0" u="none" strike="noStrike" cap="none" normalizeH="0" baseline="0" smtClean="0">
+              <a:ln>
+                <a:noFill/>
+              </a:ln>
+              <a:solidFill>
+                <a:schemeClr val="tx1"/>
+              </a:solidFill>
+              <a:effectLst/>
+              <a:latin typeface="Arial" panose="020B0604020202020204" pitchFamily="34" charset="0"/>
+            </a:endParaRPr>
           </a:p>
         </p:txBody>
       </p:sp>
     </p:spTree>
     <p:extLst>
       <p:ext uri="{BB962C8B-B14F-4D97-AF65-F5344CB8AC3E}">
-        <p14:creationId xmlns:p14="http://schemas.microsoft.com/office/powerpoint/2010/main" val="1547488010"/>
+        <p14:creationId xmlns:p14="http://schemas.microsoft.com/office/powerpoint/2010/main" val="2206627173"/>
+      </p:ext>
+    </p:extLst>
+  </p:cSld>
+  <p:clrMapOvr>
+    <a:masterClrMapping/>
+  </p:clrMapOvr>
+  <p:timing>
+    <p:tnLst>
+      <p:par>
+        <p:cTn id="1" dur="indefinite" restart="never" nodeType="tmRoot"/>
+      </p:par>
+    </p:tnLst>
+  </p:timing>
+</p:sld>
+</file>
+
+<file path=ppt/slides/slide15.xml><?xml version="1.0" encoding="utf-8"?>
+<p:sld xmlns:a="http://schemas.openxmlformats.org/drawingml/2006/main" xmlns:r="http://schemas.openxmlformats.org/officeDocument/2006/relationships" xmlns:p="http://schemas.openxmlformats.org/presentationml/2006/main">
+  <p:cSld>
+    <p:spTree>
+      <p:nvGrpSpPr>
+        <p:cNvPr id="1" name=""/>
+        <p:cNvGrpSpPr/>
+        <p:nvPr/>
+      </p:nvGrpSpPr>
+      <p:grpSpPr>
+        <a:xfrm>
+          <a:off x="0" y="0"/>
+          <a:ext cx="0" cy="0"/>
+          <a:chOff x="0" y="0"/>
+          <a:chExt cx="0" cy="0"/>
+        </a:xfrm>
+      </p:grpSpPr>
+      <p:sp>
+        <p:nvSpPr>
+          <p:cNvPr id="2" name="Title 1"/>
+          <p:cNvSpPr>
+            <a:spLocks noGrp="1"/>
+          </p:cNvSpPr>
+          <p:nvPr>
+            <p:ph type="title"/>
+          </p:nvPr>
+        </p:nvSpPr>
+        <p:spPr>
+          <a:xfrm>
+            <a:off x="838200" y="365125"/>
+            <a:ext cx="10515600" cy="1862686"/>
+          </a:xfrm>
+        </p:spPr>
+        <p:txBody>
+          <a:bodyPr/>
+          <a:lstStyle/>
+          <a:p>
+            <a:pPr algn="ctr"/>
+            <a:r>
+              <a:rPr lang="en-US" dirty="0" smtClean="0"/>
+              <a:t>WebDriver </a:t>
+            </a:r>
+            <a:r>
+              <a:rPr lang="en-US" dirty="0" err="1" smtClean="0"/>
+              <a:t>Url</a:t>
+            </a:r>
+            <a:r>
+              <a:rPr lang="en-US" dirty="0" smtClean="0"/>
+              <a:t> and Title</a:t>
+            </a:r>
+            <a:endParaRPr lang="en-US" dirty="0"/>
+          </a:p>
+        </p:txBody>
+      </p:sp>
+      <p:sp>
+        <p:nvSpPr>
+          <p:cNvPr id="3" name="Content Placeholder 2"/>
+          <p:cNvSpPr>
+            <a:spLocks noGrp="1"/>
+          </p:cNvSpPr>
+          <p:nvPr>
+            <p:ph idx="1"/>
+          </p:nvPr>
+        </p:nvSpPr>
+        <p:spPr>
+          <a:xfrm>
+            <a:off x="838200" y="1903615"/>
+            <a:ext cx="10708178" cy="4305992"/>
+          </a:xfrm>
+        </p:spPr>
+        <p:txBody>
+          <a:bodyPr>
+            <a:normAutofit/>
+          </a:bodyPr>
+          <a:lstStyle/>
+          <a:p>
+            <a:pPr lvl="1"/>
+            <a:r>
+              <a:rPr lang="en-US" dirty="0" err="1" smtClean="0"/>
+              <a:t>driver.Url</a:t>
+            </a:r>
+            <a:endParaRPr lang="en-US" dirty="0" smtClean="0"/>
+          </a:p>
+          <a:p>
+            <a:pPr lvl="1"/>
+            <a:r>
+              <a:rPr lang="en-US" dirty="0" err="1" smtClean="0"/>
+              <a:t>driver.Title</a:t>
+            </a:r>
+            <a:endParaRPr lang="en-US" dirty="0"/>
+          </a:p>
+          <a:p>
+            <a:pPr marL="457200" lvl="1" indent="0">
+              <a:buNone/>
+            </a:pPr>
+            <a:endParaRPr lang="en-US" dirty="0" smtClean="0"/>
+          </a:p>
+        </p:txBody>
+      </p:sp>
+    </p:spTree>
+    <p:extLst>
+      <p:ext uri="{BB962C8B-B14F-4D97-AF65-F5344CB8AC3E}">
+        <p14:creationId xmlns:p14="http://schemas.microsoft.com/office/powerpoint/2010/main" val="2857941905"/>
+      </p:ext>
+    </p:extLst>
+  </p:cSld>
+  <p:clrMapOvr>
+    <a:masterClrMapping/>
+  </p:clrMapOvr>
+  <p:timing>
+    <p:tnLst>
+      <p:par>
+        <p:cTn id="1" dur="indefinite" restart="never" nodeType="tmRoot"/>
+      </p:par>
+    </p:tnLst>
+  </p:timing>
+</p:sld>
+</file>
+
+<file path=ppt/slides/slide16.xml><?xml version="1.0" encoding="utf-8"?>
+<p:sld xmlns:a="http://schemas.openxmlformats.org/drawingml/2006/main" xmlns:r="http://schemas.openxmlformats.org/officeDocument/2006/relationships" xmlns:p="http://schemas.openxmlformats.org/presentationml/2006/main">
+  <p:cSld>
+    <p:spTree>
+      <p:nvGrpSpPr>
+        <p:cNvPr id="1" name=""/>
+        <p:cNvGrpSpPr/>
+        <p:nvPr/>
+      </p:nvGrpSpPr>
+      <p:grpSpPr>
+        <a:xfrm>
+          <a:off x="0" y="0"/>
+          <a:ext cx="0" cy="0"/>
+          <a:chOff x="0" y="0"/>
+          <a:chExt cx="0" cy="0"/>
+        </a:xfrm>
+      </p:grpSpPr>
+      <p:sp>
+        <p:nvSpPr>
+          <p:cNvPr id="2" name="Title 1"/>
+          <p:cNvSpPr>
+            <a:spLocks noGrp="1"/>
+          </p:cNvSpPr>
+          <p:nvPr>
+            <p:ph type="title"/>
+          </p:nvPr>
+        </p:nvSpPr>
+        <p:spPr/>
+        <p:txBody>
+          <a:bodyPr/>
+          <a:lstStyle/>
+          <a:p>
+            <a:r>
+              <a:rPr lang="en-US" dirty="0" smtClean="0"/>
+              <a:t>Homework</a:t>
+            </a:r>
+            <a:endParaRPr lang="en-US" dirty="0"/>
+          </a:p>
+        </p:txBody>
+      </p:sp>
+      <p:sp>
+        <p:nvSpPr>
+          <p:cNvPr id="3" name="Content Placeholder 2"/>
+          <p:cNvSpPr>
+            <a:spLocks noGrp="1"/>
+          </p:cNvSpPr>
+          <p:nvPr>
+            <p:ph idx="1"/>
+          </p:nvPr>
+        </p:nvSpPr>
+        <p:spPr/>
+        <p:txBody>
+          <a:bodyPr/>
+          <a:lstStyle/>
+          <a:p>
+            <a:r>
+              <a:rPr lang="en-US" dirty="0" smtClean="0"/>
+              <a:t>Add </a:t>
+            </a:r>
+            <a:r>
+              <a:rPr lang="en-US" dirty="0" smtClean="0"/>
+              <a:t>at least one Assert to each of your </a:t>
+            </a:r>
+            <a:r>
+              <a:rPr lang="en-US" dirty="0" smtClean="0"/>
+              <a:t>tests</a:t>
+            </a:r>
+            <a:endParaRPr lang="en-US" dirty="0" smtClean="0"/>
+          </a:p>
+          <a:p>
+            <a:endParaRPr lang="en-US" dirty="0" smtClean="0"/>
+          </a:p>
+          <a:p>
+            <a:endParaRPr lang="en-US" dirty="0" smtClean="0"/>
+          </a:p>
+          <a:p>
+            <a:endParaRPr lang="en-US" dirty="0"/>
+          </a:p>
+          <a:p>
+            <a:endParaRPr lang="en-US" dirty="0" smtClean="0"/>
+          </a:p>
+        </p:txBody>
+      </p:sp>
+    </p:spTree>
+    <p:extLst>
+      <p:ext uri="{BB962C8B-B14F-4D97-AF65-F5344CB8AC3E}">
+        <p14:creationId xmlns:p14="http://schemas.microsoft.com/office/powerpoint/2010/main" val="2302042848"/>
+      </p:ext>
+    </p:extLst>
+  </p:cSld>
+  <p:clrMapOvr>
+    <a:masterClrMapping/>
+  </p:clrMapOvr>
+  <p:timing>
+    <p:tnLst>
+      <p:par>
+        <p:cTn id="1" dur="indefinite" restart="never" nodeType="tmRoot"/>
+      </p:par>
+    </p:tnLst>
+  </p:timing>
+</p:sld>
+</file>
+
+<file path=ppt/slides/slide17.xml><?xml version="1.0" encoding="utf-8"?>
+<p:sld xmlns:a="http://schemas.openxmlformats.org/drawingml/2006/main" xmlns:r="http://schemas.openxmlformats.org/officeDocument/2006/relationships" xmlns:p="http://schemas.openxmlformats.org/presentationml/2006/main">
+  <p:cSld>
+    <p:spTree>
+      <p:nvGrpSpPr>
+        <p:cNvPr id="1" name=""/>
+        <p:cNvGrpSpPr/>
+        <p:nvPr/>
+      </p:nvGrpSpPr>
+      <p:grpSpPr>
+        <a:xfrm>
+          <a:off x="0" y="0"/>
+          <a:ext cx="0" cy="0"/>
+          <a:chOff x="0" y="0"/>
+          <a:chExt cx="0" cy="0"/>
+        </a:xfrm>
+      </p:grpSpPr>
+      <p:sp>
+        <p:nvSpPr>
+          <p:cNvPr id="2" name="Title 1"/>
+          <p:cNvSpPr>
+            <a:spLocks noGrp="1"/>
+          </p:cNvSpPr>
+          <p:nvPr>
+            <p:ph type="title"/>
+          </p:nvPr>
+        </p:nvSpPr>
+        <p:spPr>
+          <a:xfrm>
+            <a:off x="838200" y="365125"/>
+            <a:ext cx="10515600" cy="1862686"/>
+          </a:xfrm>
+        </p:spPr>
+        <p:txBody>
+          <a:bodyPr/>
+          <a:lstStyle/>
+          <a:p>
+            <a:pPr algn="ctr"/>
+            <a:r>
+              <a:rPr lang="en-US" dirty="0" smtClean="0"/>
+              <a:t>Demo</a:t>
+            </a:r>
+            <a:endParaRPr lang="en-US" dirty="0"/>
+          </a:p>
+        </p:txBody>
+      </p:sp>
+      <p:sp>
+        <p:nvSpPr>
+          <p:cNvPr id="3" name="Content Placeholder 2"/>
+          <p:cNvSpPr>
+            <a:spLocks noGrp="1"/>
+          </p:cNvSpPr>
+          <p:nvPr>
+            <p:ph idx="1"/>
+          </p:nvPr>
+        </p:nvSpPr>
+        <p:spPr>
+          <a:xfrm>
+            <a:off x="838200" y="1903615"/>
+            <a:ext cx="10708178" cy="4305992"/>
+          </a:xfrm>
+        </p:spPr>
+        <p:txBody>
+          <a:bodyPr>
+            <a:normAutofit/>
+          </a:bodyPr>
+          <a:lstStyle/>
+          <a:p>
+            <a:pPr lvl="1"/>
+            <a:r>
+              <a:rPr lang="en-US" dirty="0" smtClean="0"/>
+              <a:t>Selenium </a:t>
+            </a:r>
+            <a:r>
+              <a:rPr lang="en-US" dirty="0" err="1" smtClean="0"/>
+              <a:t>SetUp</a:t>
+            </a:r>
+            <a:r>
+              <a:rPr lang="en-US" dirty="0" smtClean="0"/>
+              <a:t> and </a:t>
+            </a:r>
+            <a:r>
+              <a:rPr lang="en-US" dirty="0" err="1" smtClean="0"/>
+              <a:t>TearDown</a:t>
+            </a:r>
+            <a:r>
+              <a:rPr lang="en-US" dirty="0" smtClean="0"/>
+              <a:t> (if we </a:t>
+            </a:r>
+            <a:r>
+              <a:rPr lang="en-US" smtClean="0"/>
+              <a:t>have time)</a:t>
+            </a:r>
+            <a:endParaRPr lang="en-US" dirty="0"/>
+          </a:p>
+          <a:p>
+            <a:pPr marL="457200" lvl="1" indent="0">
+              <a:buNone/>
+            </a:pPr>
+            <a:endParaRPr lang="en-US" dirty="0" smtClean="0"/>
+          </a:p>
+        </p:txBody>
+      </p:sp>
+    </p:spTree>
+    <p:extLst>
+      <p:ext uri="{BB962C8B-B14F-4D97-AF65-F5344CB8AC3E}">
+        <p14:creationId xmlns:p14="http://schemas.microsoft.com/office/powerpoint/2010/main" val="3700973678"/>
+      </p:ext>
+    </p:extLst>
+  </p:cSld>
+  <p:clrMapOvr>
+    <a:masterClrMapping/>
+  </p:clrMapOvr>
+  <p:timing>
+    <p:tnLst>
+      <p:par>
+        <p:cTn id="1" dur="indefinite" restart="never" nodeType="tmRoot"/>
+      </p:par>
+    </p:tnLst>
+  </p:timing>
+</p:sld>
+</file>
+
+<file path=ppt/slides/slide18.xml><?xml version="1.0" encoding="utf-8"?>
+<p:sld xmlns:a="http://schemas.openxmlformats.org/drawingml/2006/main" xmlns:r="http://schemas.openxmlformats.org/officeDocument/2006/relationships" xmlns:p="http://schemas.openxmlformats.org/presentationml/2006/main">
+  <p:cSld>
+    <p:spTree>
+      <p:nvGrpSpPr>
+        <p:cNvPr id="1" name=""/>
+        <p:cNvGrpSpPr/>
+        <p:nvPr/>
+      </p:nvGrpSpPr>
+      <p:grpSpPr>
+        <a:xfrm>
+          <a:off x="0" y="0"/>
+          <a:ext cx="0" cy="0"/>
+          <a:chOff x="0" y="0"/>
+          <a:chExt cx="0" cy="0"/>
+        </a:xfrm>
+      </p:grpSpPr>
+      <p:sp>
+        <p:nvSpPr>
+          <p:cNvPr id="2" name="Title 1"/>
+          <p:cNvSpPr>
+            <a:spLocks noGrp="1"/>
+          </p:cNvSpPr>
+          <p:nvPr>
+            <p:ph type="title"/>
+          </p:nvPr>
+        </p:nvSpPr>
+        <p:spPr/>
+        <p:txBody>
+          <a:bodyPr/>
+          <a:lstStyle/>
+          <a:p>
+            <a:r>
+              <a:rPr lang="en-US" dirty="0" smtClean="0"/>
+              <a:t>Homework</a:t>
+            </a:r>
+            <a:endParaRPr lang="en-US" dirty="0"/>
+          </a:p>
+        </p:txBody>
+      </p:sp>
+      <p:sp>
+        <p:nvSpPr>
+          <p:cNvPr id="3" name="Content Placeholder 2"/>
+          <p:cNvSpPr>
+            <a:spLocks noGrp="1"/>
+          </p:cNvSpPr>
+          <p:nvPr>
+            <p:ph idx="1"/>
+          </p:nvPr>
+        </p:nvSpPr>
+        <p:spPr/>
+        <p:txBody>
+          <a:bodyPr/>
+          <a:lstStyle/>
+          <a:p>
+            <a:r>
+              <a:rPr lang="en-US" dirty="0" smtClean="0"/>
+              <a:t>Create </a:t>
+            </a:r>
+            <a:r>
+              <a:rPr lang="en-US" dirty="0" err="1" smtClean="0"/>
+              <a:t>SetUp</a:t>
+            </a:r>
+            <a:r>
+              <a:rPr lang="en-US" dirty="0" smtClean="0"/>
+              <a:t> and </a:t>
+            </a:r>
+            <a:r>
+              <a:rPr lang="en-US" dirty="0" err="1" smtClean="0"/>
+              <a:t>TearDown</a:t>
+            </a:r>
+            <a:r>
+              <a:rPr lang="en-US" dirty="0" smtClean="0"/>
+              <a:t> for your own </a:t>
+            </a:r>
+            <a:r>
+              <a:rPr lang="en-US" dirty="0" err="1" smtClean="0"/>
+              <a:t>TestFixture</a:t>
+            </a:r>
+            <a:endParaRPr lang="en-US" dirty="0" smtClean="0"/>
+          </a:p>
+          <a:p>
+            <a:endParaRPr lang="en-US" dirty="0" smtClean="0"/>
+          </a:p>
+          <a:p>
+            <a:endParaRPr lang="en-US" dirty="0" smtClean="0"/>
+          </a:p>
+          <a:p>
+            <a:endParaRPr lang="en-US" dirty="0" smtClean="0"/>
+          </a:p>
+          <a:p>
+            <a:endParaRPr lang="en-US" dirty="0" smtClean="0"/>
+          </a:p>
+          <a:p>
+            <a:endParaRPr lang="en-US" dirty="0"/>
+          </a:p>
+          <a:p>
+            <a:endParaRPr lang="en-US" dirty="0" smtClean="0"/>
+          </a:p>
+        </p:txBody>
+      </p:sp>
+    </p:spTree>
+    <p:extLst>
+      <p:ext uri="{BB962C8B-B14F-4D97-AF65-F5344CB8AC3E}">
+        <p14:creationId xmlns:p14="http://schemas.microsoft.com/office/powerpoint/2010/main" val="1761873027"/>
+      </p:ext>
+    </p:extLst>
+  </p:cSld>
+  <p:clrMapOvr>
+    <a:masterClrMapping/>
+  </p:clrMapOvr>
+  <p:timing>
+    <p:tnLst>
+      <p:par>
+        <p:cTn id="1" dur="indefinite" restart="never" nodeType="tmRoot"/>
+      </p:par>
+    </p:tnLst>
+  </p:timing>
+</p:sld>
+</file>
+
+<file path=ppt/slides/slide19.xml><?xml version="1.0" encoding="utf-8"?>
+<p:sld xmlns:a="http://schemas.openxmlformats.org/drawingml/2006/main" xmlns:r="http://schemas.openxmlformats.org/officeDocument/2006/relationships" xmlns:p="http://schemas.openxmlformats.org/presentationml/2006/main">
+  <p:cSld>
+    <p:spTree>
+      <p:nvGrpSpPr>
+        <p:cNvPr id="1" name=""/>
+        <p:cNvGrpSpPr/>
+        <p:nvPr/>
+      </p:nvGrpSpPr>
+      <p:grpSpPr>
+        <a:xfrm>
+          <a:off x="0" y="0"/>
+          <a:ext cx="0" cy="0"/>
+          <a:chOff x="0" y="0"/>
+          <a:chExt cx="0" cy="0"/>
+        </a:xfrm>
+      </p:grpSpPr>
+      <p:sp>
+        <p:nvSpPr>
+          <p:cNvPr id="2" name="Title 1"/>
+          <p:cNvSpPr>
+            <a:spLocks noGrp="1"/>
+          </p:cNvSpPr>
+          <p:nvPr>
+            <p:ph type="title"/>
+          </p:nvPr>
+        </p:nvSpPr>
+        <p:spPr>
+          <a:xfrm>
+            <a:off x="1028700" y="2765425"/>
+            <a:ext cx="10515600" cy="1325563"/>
+          </a:xfrm>
+        </p:spPr>
+        <p:txBody>
+          <a:bodyPr/>
+          <a:lstStyle/>
+          <a:p>
+            <a:pPr algn="ctr"/>
+            <a:r>
+              <a:rPr lang="en-US" dirty="0" smtClean="0"/>
+              <a:t>Q &amp; A</a:t>
+            </a:r>
+            <a:endParaRPr lang="bg-BG" dirty="0"/>
+          </a:p>
+        </p:txBody>
+      </p:sp>
+    </p:spTree>
+    <p:extLst>
+      <p:ext uri="{BB962C8B-B14F-4D97-AF65-F5344CB8AC3E}">
+        <p14:creationId xmlns:p14="http://schemas.microsoft.com/office/powerpoint/2010/main" val="2079856294"/>
       </p:ext>
     </p:extLst>
   </p:cSld>
@@ -3944,6 +5786,104 @@
     <p:extLst>
       <p:ext uri="{BB962C8B-B14F-4D97-AF65-F5344CB8AC3E}">
         <p14:creationId xmlns:p14="http://schemas.microsoft.com/office/powerpoint/2010/main" val="867208210"/>
+      </p:ext>
+    </p:extLst>
+  </p:cSld>
+  <p:clrMapOvr>
+    <a:masterClrMapping/>
+  </p:clrMapOvr>
+  <p:timing>
+    <p:tnLst>
+      <p:par>
+        <p:cTn id="1" dur="indefinite" restart="never" nodeType="tmRoot"/>
+      </p:par>
+    </p:tnLst>
+  </p:timing>
+</p:sld>
+</file>
+
+<file path=ppt/slides/slide20.xml><?xml version="1.0" encoding="utf-8"?>
+<p:sld xmlns:a="http://schemas.openxmlformats.org/drawingml/2006/main" xmlns:r="http://schemas.openxmlformats.org/officeDocument/2006/relationships" xmlns:p="http://schemas.openxmlformats.org/presentationml/2006/main">
+  <p:cSld>
+    <p:spTree>
+      <p:nvGrpSpPr>
+        <p:cNvPr id="1" name=""/>
+        <p:cNvGrpSpPr/>
+        <p:nvPr/>
+      </p:nvGrpSpPr>
+      <p:grpSpPr>
+        <a:xfrm>
+          <a:off x="0" y="0"/>
+          <a:ext cx="0" cy="0"/>
+          <a:chOff x="0" y="0"/>
+          <a:chExt cx="0" cy="0"/>
+        </a:xfrm>
+      </p:grpSpPr>
+      <p:sp>
+        <p:nvSpPr>
+          <p:cNvPr id="2" name="Title 1"/>
+          <p:cNvSpPr>
+            <a:spLocks noGrp="1"/>
+          </p:cNvSpPr>
+          <p:nvPr>
+            <p:ph type="title"/>
+          </p:nvPr>
+        </p:nvSpPr>
+        <p:spPr>
+          <a:xfrm>
+            <a:off x="995449" y="637366"/>
+            <a:ext cx="10515600" cy="1325563"/>
+          </a:xfrm>
+        </p:spPr>
+        <p:txBody>
+          <a:bodyPr/>
+          <a:lstStyle/>
+          <a:p>
+            <a:pPr algn="ctr"/>
+            <a:r>
+              <a:rPr lang="en-US" dirty="0" smtClean="0"/>
+              <a:t>Sources: </a:t>
+            </a:r>
+            <a:endParaRPr lang="bg-BG" dirty="0"/>
+          </a:p>
+        </p:txBody>
+      </p:sp>
+      <p:sp>
+        <p:nvSpPr>
+          <p:cNvPr id="3" name="Rectangle 2"/>
+          <p:cNvSpPr/>
+          <p:nvPr/>
+        </p:nvSpPr>
+        <p:spPr>
+          <a:xfrm>
+            <a:off x="1504604" y="1962929"/>
+            <a:ext cx="9601200" cy="369332"/>
+          </a:xfrm>
+          <a:prstGeom prst="rect">
+            <a:avLst/>
+          </a:prstGeom>
+        </p:spPr>
+        <p:txBody>
+          <a:bodyPr wrap="square">
+            <a:spAutoFit/>
+          </a:bodyPr>
+          <a:lstStyle/>
+          <a:p>
+            <a:r>
+              <a:rPr lang="en-US" dirty="0" smtClean="0"/>
+              <a:t>1. https</a:t>
+            </a:r>
+            <a:r>
+              <a:rPr lang="en-US" dirty="0"/>
+              <a:t>://github.com/nunit/docs</a:t>
+            </a:r>
+          </a:p>
+        </p:txBody>
+      </p:sp>
+    </p:spTree>
+    <p:extLst>
+      <p:ext uri="{BB962C8B-B14F-4D97-AF65-F5344CB8AC3E}">
+        <p14:creationId xmlns:p14="http://schemas.microsoft.com/office/powerpoint/2010/main" val="1547488010"/>
       </p:ext>
     </p:extLst>
   </p:cSld>
@@ -4170,15 +6110,11 @@
           <a:p>
             <a:r>
               <a:rPr lang="en-US" dirty="0" smtClean="0"/>
-              <a:t>In selectors there should be words that has HUMAN meaning like: header, footer, left column, Search module, Some other module; </a:t>
-            </a:r>
-            <a:r>
-              <a:rPr lang="en-US" dirty="0" smtClean="0"/>
-              <a:t>Don’t use words like </a:t>
+              <a:t>In selectors there should be words that has HUMAN meaning like: header, footer, left column, Search module, Some other module; instead </a:t>
             </a:r>
             <a:r>
               <a:rPr lang="en-US" dirty="0"/>
-              <a:t>“content-wrap content-fluid” “</a:t>
+              <a:t>of  “content-wrap content-fluid” “</a:t>
             </a:r>
             <a:r>
               <a:rPr lang="en-US" dirty="0" err="1" smtClean="0"/>
@@ -4197,7 +6133,7 @@
           </a:p>
           <a:p>
             <a:r>
-              <a:rPr lang="en-US" b="1" dirty="0" smtClean="0"/>
+              <a:rPr lang="en-US" dirty="0" smtClean="0"/>
               <a:t>Always try to find what makes the element unique</a:t>
             </a:r>
           </a:p>
@@ -4328,17 +6264,8 @@
             </a:r>
             <a:r>
               <a:rPr lang="en-US" dirty="0" smtClean="0"/>
-              <a:t> Assertions and </a:t>
-            </a:r>
-            <a:r>
-              <a:rPr lang="en-US" dirty="0" smtClean="0"/>
-              <a:t>Warnings </a:t>
-            </a:r>
-            <a:r>
-              <a:rPr lang="en-US" i="1" dirty="0" smtClean="0"/>
-              <a:t>– postponed: next week</a:t>
-            </a:r>
-            <a:endParaRPr lang="en-US" i="1" dirty="0" smtClean="0"/>
+              <a:t> Assertions and Warnings</a:t>
+            </a:r>
           </a:p>
           <a:p>
             <a:r>
@@ -4350,26 +6277,10 @@
               <a:t> </a:t>
             </a:r>
             <a:r>
-              <a:rPr lang="en-US" dirty="0" err="1"/>
+              <a:rPr lang="en-US" dirty="0" err="1" smtClean="0"/>
               <a:t>WebDriver.Title</a:t>
             </a:r>
-            <a:r>
-              <a:rPr lang="en-US" dirty="0"/>
-              <a:t> </a:t>
-            </a:r>
-            <a:r>
-              <a:rPr lang="en-US" i="1" dirty="0"/>
-              <a:t>– postponed: </a:t>
-            </a:r>
-            <a:r>
-              <a:rPr lang="en-US" i="1" dirty="0" smtClean="0"/>
-              <a:t>next </a:t>
-            </a:r>
-            <a:r>
-              <a:rPr lang="en-US" i="1" dirty="0"/>
-              <a:t>week</a:t>
-            </a:r>
-            <a:endParaRPr lang="en-US" i="1" dirty="0"/>
+            <a:endParaRPr lang="en-US" dirty="0"/>
           </a:p>
         </p:txBody>
       </p:sp>

</xml_diff>

<commit_message>
QA: optional homework week 6
</commit_message>
<xml_diff>
--- a/Presentations/QA Automation Course Week 5.pptx
+++ b/Presentations/QA Automation Course Week 5.pptx
@@ -22,9 +22,8 @@
     <p:sldId id="294" r:id="rId16"/>
     <p:sldId id="299" r:id="rId17"/>
     <p:sldId id="293" r:id="rId18"/>
-    <p:sldId id="270" r:id="rId19"/>
-    <p:sldId id="260" r:id="rId20"/>
-    <p:sldId id="292" r:id="rId21"/>
+    <p:sldId id="260" r:id="rId19"/>
+    <p:sldId id="292" r:id="rId20"/>
   </p:sldIdLst>
   <p:sldSz cx="12192000" cy="6858000"/>
   <p:notesSz cx="6858000" cy="9144000"/>
@@ -5367,24 +5366,153 @@
         </p:nvSpPr>
         <p:spPr/>
         <p:txBody>
-          <a:bodyPr/>
-          <a:lstStyle/>
-          <a:p>
-            <a:r>
-              <a:rPr lang="en-US" dirty="0" smtClean="0"/>
-              <a:t>Add </a:t>
-            </a:r>
-            <a:r>
-              <a:rPr lang="en-US" dirty="0" smtClean="0"/>
-              <a:t>at least one Assert to each of your </a:t>
+          <a:bodyPr>
+            <a:normAutofit lnSpcReduction="10000"/>
+          </a:bodyPr>
+          <a:lstStyle/>
+          <a:p>
+            <a:r>
+              <a:rPr lang="en-US" dirty="0" smtClean="0"/>
+              <a:t>Add at least one Assert to each of your </a:t>
             </a:r>
             <a:r>
               <a:rPr lang="en-US" dirty="0" smtClean="0"/>
               <a:t>tests</a:t>
             </a:r>
-            <a:endParaRPr lang="en-US" dirty="0" smtClean="0"/>
-          </a:p>
-          <a:p>
+          </a:p>
+          <a:p>
+            <a:r>
+              <a:rPr lang="en-US" b="1" i="1" dirty="0" smtClean="0"/>
+              <a:t>Optional</a:t>
+            </a:r>
+            <a:r>
+              <a:rPr lang="en-US" dirty="0" smtClean="0"/>
+              <a:t>: One and the same test in different break points:</a:t>
+            </a:r>
+          </a:p>
+          <a:p>
+            <a:pPr marL="457200" lvl="1" indent="0">
+              <a:buNone/>
+            </a:pPr>
+            <a:r>
+              <a:rPr lang="en-US" dirty="0" smtClean="0"/>
+              <a:t>Create a test to check that </a:t>
+            </a:r>
+            <a:r>
+              <a:rPr lang="en-US" dirty="0" err="1" smtClean="0"/>
+              <a:t>Yavlena</a:t>
+            </a:r>
+            <a:r>
+              <a:rPr lang="en-US" dirty="0" smtClean="0"/>
+              <a:t> logo is present both on Desktop and Mobile view.</a:t>
+            </a:r>
+          </a:p>
+          <a:p>
+            <a:pPr marL="457200" lvl="1" indent="0">
+              <a:buNone/>
+            </a:pPr>
+            <a:r>
+              <a:rPr lang="en-US" dirty="0" smtClean="0"/>
+              <a:t>Hint: use </a:t>
+            </a:r>
+            <a:r>
+              <a:rPr lang="en-US" dirty="0" err="1" smtClean="0"/>
+              <a:t>TestCase</a:t>
+            </a:r>
+            <a:r>
+              <a:rPr lang="en-US" dirty="0" smtClean="0"/>
+              <a:t> attribute to pass the test as argument the window size. Use </a:t>
+            </a:r>
+          </a:p>
+          <a:p>
+            <a:pPr marL="457200" lvl="1" indent="0">
+              <a:buNone/>
+            </a:pPr>
+            <a:r>
+              <a:rPr lang="en-US" i="1" dirty="0"/>
+              <a:t> </a:t>
+            </a:r>
+            <a:r>
+              <a:rPr lang="en-US" i="1" dirty="0" smtClean="0"/>
+              <a:t>	</a:t>
+            </a:r>
+            <a:r>
+              <a:rPr lang="en-US" i="1" dirty="0" err="1" smtClean="0"/>
+              <a:t>driver.Manage</a:t>
+            </a:r>
+            <a:r>
+              <a:rPr lang="en-US" i="1" dirty="0"/>
+              <a:t>().</a:t>
+            </a:r>
+            <a:r>
+              <a:rPr lang="en-US" i="1" dirty="0" err="1"/>
+              <a:t>Window.Size</a:t>
+            </a:r>
+            <a:r>
+              <a:rPr lang="en-US" i="1" dirty="0"/>
+              <a:t> = new </a:t>
+            </a:r>
+            <a:r>
+              <a:rPr lang="en-US" i="1" dirty="0" err="1"/>
+              <a:t>System.Drawing.Size</a:t>
+            </a:r>
+            <a:r>
+              <a:rPr lang="en-US" i="1" dirty="0"/>
+              <a:t>(300, 968);</a:t>
+            </a:r>
+            <a:r>
+              <a:rPr lang="en-US" i="1" dirty="0" smtClean="0"/>
+              <a:t> </a:t>
+            </a:r>
+          </a:p>
+          <a:p>
+            <a:pPr marL="457200" lvl="1" indent="0">
+              <a:buNone/>
+            </a:pPr>
+            <a:r>
+              <a:rPr lang="en-US" i="1" dirty="0" smtClean="0"/>
+              <a:t>to resize your window</a:t>
+            </a:r>
+          </a:p>
+          <a:p>
+            <a:r>
+              <a:rPr lang="en-US" b="1" i="1" dirty="0" smtClean="0"/>
+              <a:t>Advanced Optional</a:t>
+            </a:r>
+            <a:r>
+              <a:rPr lang="en-US" dirty="0"/>
+              <a:t>: </a:t>
+            </a:r>
+            <a:r>
+              <a:rPr lang="en-US" dirty="0" smtClean="0"/>
+              <a:t>Create a test to check element that is changing from Desktop to Mobile view</a:t>
+            </a:r>
+          </a:p>
+          <a:p>
+            <a:pPr marL="457200" lvl="1" indent="0">
+              <a:buNone/>
+            </a:pPr>
+            <a:r>
+              <a:rPr lang="en-US" dirty="0" smtClean="0"/>
+              <a:t>Create a test to click on the “</a:t>
+            </a:r>
+            <a:r>
+              <a:rPr lang="bg-BG" dirty="0" smtClean="0"/>
+              <a:t>Продажба</a:t>
+            </a:r>
+            <a:r>
+              <a:rPr lang="en-US" dirty="0" smtClean="0"/>
+              <a:t>” link in the header of the website. The test should be valid for both Desktop </a:t>
+            </a:r>
+            <a:r>
+              <a:rPr lang="en-US" dirty="0"/>
+              <a:t>and Mobile view</a:t>
+            </a:r>
+          </a:p>
+          <a:p>
+            <a:pPr marL="0" indent="0">
+              <a:buNone/>
+            </a:pPr>
             <a:endParaRPr lang="en-US" dirty="0" smtClean="0"/>
           </a:p>
           <a:p>
@@ -5505,18 +5633,8 @@
             </a:r>
             <a:r>
               <a:rPr lang="en-US" dirty="0" smtClean="0"/>
-              <a:t> (if we </a:t>
-            </a:r>
-            <a:r>
-              <a:rPr lang="en-US" smtClean="0"/>
-              <a:t>have time)</a:t>
-            </a:r>
-            <a:endParaRPr lang="en-US" dirty="0"/>
-          </a:p>
-          <a:p>
-            <a:pPr marL="457200" lvl="1" indent="0">
-              <a:buNone/>
-            </a:pPr>
+              <a:t> (moved to week 7)</a:t>
+            </a:r>
             <a:endParaRPr lang="en-US" dirty="0" smtClean="0"/>
           </a:p>
         </p:txBody>
@@ -5568,84 +5686,29 @@
             <p:ph type="title"/>
           </p:nvPr>
         </p:nvSpPr>
-        <p:spPr/>
+        <p:spPr>
+          <a:xfrm>
+            <a:off x="1028700" y="2765425"/>
+            <a:ext cx="10515600" cy="1325563"/>
+          </a:xfrm>
+        </p:spPr>
         <p:txBody>
           <a:bodyPr/>
           <a:lstStyle/>
           <a:p>
-            <a:r>
-              <a:rPr lang="en-US" dirty="0" smtClean="0"/>
-              <a:t>Homework</a:t>
-            </a:r>
-            <a:endParaRPr lang="en-US" dirty="0"/>
-          </a:p>
-        </p:txBody>
-      </p:sp>
-      <p:sp>
-        <p:nvSpPr>
-          <p:cNvPr id="3" name="Content Placeholder 2"/>
-          <p:cNvSpPr>
-            <a:spLocks noGrp="1"/>
-          </p:cNvSpPr>
-          <p:nvPr>
-            <p:ph idx="1"/>
-          </p:nvPr>
-        </p:nvSpPr>
-        <p:spPr/>
-        <p:txBody>
-          <a:bodyPr/>
-          <a:lstStyle/>
-          <a:p>
-            <a:r>
-              <a:rPr lang="en-US" dirty="0" smtClean="0"/>
-              <a:t>Create </a:t>
-            </a:r>
-            <a:r>
-              <a:rPr lang="en-US" dirty="0" err="1" smtClean="0"/>
-              <a:t>SetUp</a:t>
-            </a:r>
-            <a:r>
-              <a:rPr lang="en-US" dirty="0" smtClean="0"/>
-              <a:t> and </a:t>
-            </a:r>
-            <a:r>
-              <a:rPr lang="en-US" dirty="0" err="1" smtClean="0"/>
-              <a:t>TearDown</a:t>
-            </a:r>
-            <a:r>
-              <a:rPr lang="en-US" dirty="0" smtClean="0"/>
-              <a:t> for your own </a:t>
-            </a:r>
-            <a:r>
-              <a:rPr lang="en-US" dirty="0" err="1" smtClean="0"/>
-              <a:t>TestFixture</a:t>
-            </a:r>
-            <a:endParaRPr lang="en-US" dirty="0" smtClean="0"/>
-          </a:p>
-          <a:p>
-            <a:endParaRPr lang="en-US" dirty="0" smtClean="0"/>
-          </a:p>
-          <a:p>
-            <a:endParaRPr lang="en-US" dirty="0" smtClean="0"/>
-          </a:p>
-          <a:p>
-            <a:endParaRPr lang="en-US" dirty="0" smtClean="0"/>
-          </a:p>
-          <a:p>
-            <a:endParaRPr lang="en-US" dirty="0" smtClean="0"/>
-          </a:p>
-          <a:p>
-            <a:endParaRPr lang="en-US" dirty="0"/>
-          </a:p>
-          <a:p>
-            <a:endParaRPr lang="en-US" dirty="0" smtClean="0"/>
+            <a:pPr algn="ctr"/>
+            <a:r>
+              <a:rPr lang="en-US" dirty="0" smtClean="0"/>
+              <a:t>Q &amp; A</a:t>
+            </a:r>
+            <a:endParaRPr lang="bg-BG" dirty="0"/>
           </a:p>
         </p:txBody>
       </p:sp>
     </p:spTree>
     <p:extLst>
       <p:ext uri="{BB962C8B-B14F-4D97-AF65-F5344CB8AC3E}">
-        <p14:creationId xmlns:p14="http://schemas.microsoft.com/office/powerpoint/2010/main" val="1761873027"/>
+        <p14:creationId xmlns:p14="http://schemas.microsoft.com/office/powerpoint/2010/main" val="2079856294"/>
       </p:ext>
     </p:extLst>
   </p:cSld>
@@ -5691,7 +5754,7 @@
         </p:nvSpPr>
         <p:spPr>
           <a:xfrm>
-            <a:off x="1028700" y="2765425"/>
+            <a:off x="995449" y="637366"/>
             <a:ext cx="10515600" cy="1325563"/>
           </a:xfrm>
         </p:spPr>
@@ -5702,16 +5765,48 @@
             <a:pPr algn="ctr"/>
             <a:r>
               <a:rPr lang="en-US" dirty="0" smtClean="0"/>
-              <a:t>Q &amp; A</a:t>
+              <a:t>Sources: </a:t>
             </a:r>
             <a:endParaRPr lang="bg-BG" dirty="0"/>
+          </a:p>
+        </p:txBody>
+      </p:sp>
+      <p:sp>
+        <p:nvSpPr>
+          <p:cNvPr id="3" name="Rectangle 2"/>
+          <p:cNvSpPr/>
+          <p:nvPr/>
+        </p:nvSpPr>
+        <p:spPr>
+          <a:xfrm>
+            <a:off x="1504604" y="1962929"/>
+            <a:ext cx="9601200" cy="369332"/>
+          </a:xfrm>
+          <a:prstGeom prst="rect">
+            <a:avLst/>
+          </a:prstGeom>
+        </p:spPr>
+        <p:txBody>
+          <a:bodyPr wrap="square">
+            <a:spAutoFit/>
+          </a:bodyPr>
+          <a:lstStyle/>
+          <a:p>
+            <a:r>
+              <a:rPr lang="en-US" dirty="0" smtClean="0"/>
+              <a:t>1. https</a:t>
+            </a:r>
+            <a:r>
+              <a:rPr lang="en-US" dirty="0"/>
+              <a:t>://github.com/nunit/docs</a:t>
+            </a:r>
           </a:p>
         </p:txBody>
       </p:sp>
     </p:spTree>
     <p:extLst>
       <p:ext uri="{BB962C8B-B14F-4D97-AF65-F5344CB8AC3E}">
-        <p14:creationId xmlns:p14="http://schemas.microsoft.com/office/powerpoint/2010/main" val="2079856294"/>
+        <p14:creationId xmlns:p14="http://schemas.microsoft.com/office/powerpoint/2010/main" val="1547488010"/>
       </p:ext>
     </p:extLst>
   </p:cSld>
@@ -5786,104 +5881,6 @@
     <p:extLst>
       <p:ext uri="{BB962C8B-B14F-4D97-AF65-F5344CB8AC3E}">
         <p14:creationId xmlns:p14="http://schemas.microsoft.com/office/powerpoint/2010/main" val="867208210"/>
-      </p:ext>
-    </p:extLst>
-  </p:cSld>
-  <p:clrMapOvr>
-    <a:masterClrMapping/>
-  </p:clrMapOvr>
-  <p:timing>
-    <p:tnLst>
-      <p:par>
-        <p:cTn id="1" dur="indefinite" restart="never" nodeType="tmRoot"/>
-      </p:par>
-    </p:tnLst>
-  </p:timing>
-</p:sld>
-</file>
-
-<file path=ppt/slides/slide20.xml><?xml version="1.0" encoding="utf-8"?>
-<p:sld xmlns:a="http://schemas.openxmlformats.org/drawingml/2006/main" xmlns:r="http://schemas.openxmlformats.org/officeDocument/2006/relationships" xmlns:p="http://schemas.openxmlformats.org/presentationml/2006/main">
-  <p:cSld>
-    <p:spTree>
-      <p:nvGrpSpPr>
-        <p:cNvPr id="1" name=""/>
-        <p:cNvGrpSpPr/>
-        <p:nvPr/>
-      </p:nvGrpSpPr>
-      <p:grpSpPr>
-        <a:xfrm>
-          <a:off x="0" y="0"/>
-          <a:ext cx="0" cy="0"/>
-          <a:chOff x="0" y="0"/>
-          <a:chExt cx="0" cy="0"/>
-        </a:xfrm>
-      </p:grpSpPr>
-      <p:sp>
-        <p:nvSpPr>
-          <p:cNvPr id="2" name="Title 1"/>
-          <p:cNvSpPr>
-            <a:spLocks noGrp="1"/>
-          </p:cNvSpPr>
-          <p:nvPr>
-            <p:ph type="title"/>
-          </p:nvPr>
-        </p:nvSpPr>
-        <p:spPr>
-          <a:xfrm>
-            <a:off x="995449" y="637366"/>
-            <a:ext cx="10515600" cy="1325563"/>
-          </a:xfrm>
-        </p:spPr>
-        <p:txBody>
-          <a:bodyPr/>
-          <a:lstStyle/>
-          <a:p>
-            <a:pPr algn="ctr"/>
-            <a:r>
-              <a:rPr lang="en-US" dirty="0" smtClean="0"/>
-              <a:t>Sources: </a:t>
-            </a:r>
-            <a:endParaRPr lang="bg-BG" dirty="0"/>
-          </a:p>
-        </p:txBody>
-      </p:sp>
-      <p:sp>
-        <p:nvSpPr>
-          <p:cNvPr id="3" name="Rectangle 2"/>
-          <p:cNvSpPr/>
-          <p:nvPr/>
-        </p:nvSpPr>
-        <p:spPr>
-          <a:xfrm>
-            <a:off x="1504604" y="1962929"/>
-            <a:ext cx="9601200" cy="369332"/>
-          </a:xfrm>
-          <a:prstGeom prst="rect">
-            <a:avLst/>
-          </a:prstGeom>
-        </p:spPr>
-        <p:txBody>
-          <a:bodyPr wrap="square">
-            <a:spAutoFit/>
-          </a:bodyPr>
-          <a:lstStyle/>
-          <a:p>
-            <a:r>
-              <a:rPr lang="en-US" dirty="0" smtClean="0"/>
-              <a:t>1. https</a:t>
-            </a:r>
-            <a:r>
-              <a:rPr lang="en-US" dirty="0"/>
-              <a:t>://github.com/nunit/docs</a:t>
-            </a:r>
-          </a:p>
-        </p:txBody>
-      </p:sp>
-    </p:spTree>
-    <p:extLst>
-      <p:ext uri="{BB962C8B-B14F-4D97-AF65-F5344CB8AC3E}">
-        <p14:creationId xmlns:p14="http://schemas.microsoft.com/office/powerpoint/2010/main" val="1547488010"/>
       </p:ext>
     </p:extLst>
   </p:cSld>

</xml_diff>